<commit_message>
Updated and done with mod 2
</commit_message>
<xml_diff>
--- a/Module_Two/presentations/module_2_presentation.pptx
+++ b/Module_Two/presentations/module_2_presentation.pptx
@@ -5,7 +5,7 @@
     <p:sldMasterId id="2147483655" r:id="rId1"/>
   </p:sldMasterIdLst>
   <p:notesMasterIdLst>
-    <p:notesMasterId r:id="rId43"/>
+    <p:notesMasterId r:id="rId59"/>
   </p:notesMasterIdLst>
   <p:sldIdLst>
     <p:sldId id="256" r:id="rId2"/>
@@ -48,7 +48,23 @@
     <p:sldId id="518" r:id="rId39"/>
     <p:sldId id="519" r:id="rId40"/>
     <p:sldId id="520" r:id="rId41"/>
-    <p:sldId id="489" r:id="rId42"/>
+    <p:sldId id="521" r:id="rId42"/>
+    <p:sldId id="522" r:id="rId43"/>
+    <p:sldId id="523" r:id="rId44"/>
+    <p:sldId id="524" r:id="rId45"/>
+    <p:sldId id="525" r:id="rId46"/>
+    <p:sldId id="526" r:id="rId47"/>
+    <p:sldId id="528" r:id="rId48"/>
+    <p:sldId id="529" r:id="rId49"/>
+    <p:sldId id="530" r:id="rId50"/>
+    <p:sldId id="531" r:id="rId51"/>
+    <p:sldId id="527" r:id="rId52"/>
+    <p:sldId id="532" r:id="rId53"/>
+    <p:sldId id="533" r:id="rId54"/>
+    <p:sldId id="534" r:id="rId55"/>
+    <p:sldId id="535" r:id="rId56"/>
+    <p:sldId id="536" r:id="rId57"/>
+    <p:sldId id="489" r:id="rId58"/>
   </p:sldIdLst>
   <p:sldSz cx="9144000" cy="6858000" type="screen4x3"/>
   <p:notesSz cx="6858000" cy="9144000"/>
@@ -3785,7 +3801,7 @@
             </a:pPr>
             <a:fld id="{00000000-1234-1234-1234-123412341234}" type="slidenum">
               <a:rPr lang="en-US"/>
-              <a:t>41</a:t>
+              <a:t>57</a:t>
             </a:fld>
             <a:endParaRPr lang="en-US"/>
           </a:p>
@@ -17943,7 +17959,7 @@
   <p:cSld>
     <p:spTree>
       <p:nvGrpSpPr>
-        <p:cNvPr id="1" name="Shape 113"/>
+        <p:cNvPr id="1" name=""/>
         <p:cNvGrpSpPr/>
         <p:nvPr/>
       </p:nvGrpSpPr>
@@ -17957,216 +17973,156 @@
       </p:grpSpPr>
       <p:sp>
         <p:nvSpPr>
-          <p:cNvPr id="114" name="Shape 114"/>
-          <p:cNvSpPr txBox="1">
+          <p:cNvPr id="2" name="Title 1">
+            <a:extLst>
+              <a:ext uri="{FF2B5EF4-FFF2-40B4-BE49-F238E27FC236}">
+                <a16:creationId xmlns:a16="http://schemas.microsoft.com/office/drawing/2014/main" id="{AF6E8099-0508-D848-A00A-BD861CFFA347}"/>
+              </a:ext>
+            </a:extLst>
+          </p:cNvPr>
+          <p:cNvSpPr>
             <a:spLocks noGrp="1"/>
           </p:cNvSpPr>
           <p:nvPr>
             <p:ph type="title"/>
           </p:nvPr>
         </p:nvSpPr>
-        <p:spPr>
-          <a:xfrm>
-            <a:off x="76200" y="152400"/>
-            <a:ext cx="8991600" cy="671400"/>
-          </a:xfrm>
-          <a:prstGeom prst="rect">
-            <a:avLst/>
-          </a:prstGeom>
-        </p:spPr>
+        <p:spPr/>
         <p:txBody>
-          <a:bodyPr lIns="91425" tIns="91425" rIns="91425" bIns="91425" anchor="ctr" anchorCtr="0">
-            <a:noAutofit/>
-          </a:bodyPr>
+          <a:bodyPr/>
           <a:lstStyle/>
           <a:p>
-            <a:pPr lvl="0">
-              <a:spcBef>
-                <a:spcPts val="0"/>
-              </a:spcBef>
-              <a:buNone/>
-            </a:pPr>
             <a:r>
               <a:rPr lang="en-US" dirty="0"/>
-              <a:t>Golang Playground</a:t>
-            </a:r>
-            <a:endParaRPr dirty="0"/>
+              <a:t>Maps in GO</a:t>
+            </a:r>
           </a:p>
         </p:txBody>
       </p:sp>
       <p:sp>
         <p:nvSpPr>
-          <p:cNvPr id="115" name="Shape 115"/>
-          <p:cNvSpPr txBox="1">
+          <p:cNvPr id="3" name="Text Placeholder 2">
+            <a:extLst>
+              <a:ext uri="{FF2B5EF4-FFF2-40B4-BE49-F238E27FC236}">
+                <a16:creationId xmlns:a16="http://schemas.microsoft.com/office/drawing/2014/main" id="{94078797-0EC7-4F45-9CD8-4C7D3E1EF536}"/>
+              </a:ext>
+            </a:extLst>
+          </p:cNvPr>
+          <p:cNvSpPr>
             <a:spLocks noGrp="1"/>
           </p:cNvSpPr>
           <p:nvPr>
             <p:ph type="body" idx="1"/>
           </p:nvPr>
         </p:nvSpPr>
-        <p:spPr>
-          <a:xfrm>
-            <a:off x="76200" y="1240810"/>
-            <a:ext cx="8991600" cy="4070929"/>
-          </a:xfrm>
-          <a:prstGeom prst="rect">
-            <a:avLst/>
-          </a:prstGeom>
-        </p:spPr>
+        <p:spPr/>
         <p:txBody>
-          <a:bodyPr lIns="91425" tIns="91425" rIns="91425" bIns="91425" anchor="t" anchorCtr="0">
-            <a:noAutofit/>
-          </a:bodyPr>
+          <a:bodyPr/>
           <a:lstStyle/>
           <a:p>
-            <a:pPr lvl="2">
-              <a:spcBef>
-                <a:spcPts val="0"/>
-              </a:spcBef>
+            <a:r>
+              <a:rPr lang="en-US" dirty="0"/>
+              <a:t> Dictionaries in python. OBJECTS in node. </a:t>
+            </a:r>
+            <a:r>
+              <a:rPr lang="en-US" b="1" dirty="0"/>
+              <a:t>Maps in GO. </a:t>
+            </a:r>
+          </a:p>
+          <a:p>
+            <a:r>
+              <a:rPr lang="en-US" dirty="0"/>
+              <a:t> Maps are hash table implementations </a:t>
+            </a:r>
+          </a:p>
+          <a:p>
+            <a:pPr marL="177800" indent="0">
+              <a:buNone/>
+            </a:pPr>
+            <a:endParaRPr lang="en-US" dirty="0">
+              <a:highlight>
+                <a:srgbClr val="FFFF00"/>
+              </a:highlight>
+              <a:latin typeface="American Typewriter" panose="02090604020004020304" pitchFamily="18" charset="77"/>
+            </a:endParaRPr>
+          </a:p>
+          <a:p>
+            <a:pPr marL="177800" indent="0">
+              <a:buNone/>
             </a:pPr>
             <a:r>
               <a:rPr lang="en-US" dirty="0">
-                <a:solidFill>
-                  <a:schemeClr val="tx1"/>
-                </a:solidFill>
+                <a:highlight>
+                  <a:srgbClr val="FFFF00"/>
+                </a:highlight>
+                <a:latin typeface="American Typewriter" panose="02090604020004020304" pitchFamily="18" charset="77"/>
+              </a:rPr>
+              <a:t>map[</a:t>
+            </a:r>
+            <a:r>
+              <a:rPr lang="en-US" dirty="0" err="1">
+                <a:highlight>
+                  <a:srgbClr val="FFFF00"/>
+                </a:highlight>
+                <a:latin typeface="American Typewriter" panose="02090604020004020304" pitchFamily="18" charset="77"/>
+              </a:rPr>
+              <a:t>KeyType</a:t>
+            </a:r>
+            <a:r>
+              <a:rPr lang="en-US" dirty="0">
+                <a:highlight>
+                  <a:srgbClr val="FFFF00"/>
+                </a:highlight>
+                <a:latin typeface="American Typewriter" panose="02090604020004020304" pitchFamily="18" charset="77"/>
+              </a:rPr>
+              <a:t>]</a:t>
+            </a:r>
+            <a:r>
+              <a:rPr lang="en-US" dirty="0" err="1">
+                <a:highlight>
+                  <a:srgbClr val="FFFF00"/>
+                </a:highlight>
+                <a:latin typeface="American Typewriter" panose="02090604020004020304" pitchFamily="18" charset="77"/>
+              </a:rPr>
+              <a:t>ValueType</a:t>
+            </a:r>
+            <a:endParaRPr lang="en-US" dirty="0">
+              <a:highlight>
+                <a:srgbClr val="FFFF00"/>
+              </a:highlight>
+              <a:latin typeface="American Typewriter" panose="02090604020004020304" pitchFamily="18" charset="77"/>
+            </a:endParaRPr>
+          </a:p>
+          <a:p>
+            <a:pPr marL="177800" indent="0">
+              <a:buNone/>
+            </a:pPr>
+            <a:endParaRPr lang="en-US" dirty="0">
+              <a:highlight>
+                <a:srgbClr val="FFFF00"/>
+              </a:highlight>
+              <a:latin typeface="American Typewriter" panose="02090604020004020304" pitchFamily="18" charset="77"/>
+            </a:endParaRPr>
+          </a:p>
+          <a:p>
+            <a:pPr marL="177800" indent="0">
+              <a:buNone/>
+            </a:pPr>
+            <a:r>
+              <a:rPr lang="en-US" dirty="0">
                 <a:latin typeface="+mn-lt"/>
               </a:rPr>
-              <a:t>All of this being said- this is what we’re going to use going forward for most of our intro coding!</a:t>
-            </a:r>
-          </a:p>
-          <a:p>
-            <a:pPr lvl="2">
-              <a:spcBef>
-                <a:spcPts val="0"/>
-              </a:spcBef>
-            </a:pPr>
-            <a:r>
-              <a:rPr lang="en-US" dirty="0">
-                <a:solidFill>
-                  <a:schemeClr val="tx1"/>
-                </a:solidFill>
-                <a:latin typeface="+mn-lt"/>
-              </a:rPr>
-              <a:t>We are now set up and ready to ”go!”</a:t>
-            </a:r>
-          </a:p>
-          <a:p>
-            <a:pPr lvl="2">
-              <a:spcBef>
-                <a:spcPts val="0"/>
-              </a:spcBef>
-            </a:pPr>
-            <a:r>
-              <a:rPr lang="en-US" dirty="0">
-                <a:solidFill>
-                  <a:schemeClr val="tx1"/>
-                </a:solidFill>
-                <a:latin typeface="+mn-lt"/>
-              </a:rPr>
-              <a:t> </a:t>
-            </a:r>
-            <a:r>
-              <a:rPr lang="en-US" sz="3200" dirty="0">
-                <a:solidFill>
-                  <a:schemeClr val="tx1"/>
-                </a:solidFill>
-                <a:latin typeface="+mn-lt"/>
-              </a:rPr>
-              <a:t>ANY QUESTIONS?!?</a:t>
-            </a:r>
-          </a:p>
-          <a:p>
-            <a:pPr lvl="3">
-              <a:spcBef>
-                <a:spcPts val="0"/>
-              </a:spcBef>
+              <a:t>Use the “make” built in function to create maps. Remember- the original initialization is ”nil”</a:t>
+            </a:r>
+          </a:p>
+          <a:p>
+            <a:pPr marL="177800" indent="0">
+              <a:buNone/>
             </a:pPr>
             <a:endParaRPr lang="en-US" dirty="0">
-              <a:solidFill>
-                <a:schemeClr val="tx1"/>
-              </a:solidFill>
-              <a:latin typeface="+mn-lt"/>
-            </a:endParaRPr>
-          </a:p>
-          <a:p>
-            <a:pPr lvl="2">
-              <a:spcBef>
-                <a:spcPts val="0"/>
-              </a:spcBef>
-            </a:pPr>
-            <a:endParaRPr lang="en-US" dirty="0">
-              <a:solidFill>
-                <a:schemeClr val="tx1"/>
-              </a:solidFill>
-            </a:endParaRPr>
-          </a:p>
-          <a:p>
-            <a:pPr marL="1485900" lvl="3" indent="0">
-              <a:spcBef>
-                <a:spcPts val="0"/>
-              </a:spcBef>
-              <a:buNone/>
-            </a:pPr>
-            <a:endParaRPr lang="en-US" dirty="0">
-              <a:solidFill>
-                <a:schemeClr val="tx1"/>
-              </a:solidFill>
-              <a:latin typeface="+mn-lt"/>
-            </a:endParaRPr>
-          </a:p>
-          <a:p>
-            <a:pPr marL="1485900" lvl="3" indent="0">
-              <a:spcBef>
-                <a:spcPts val="0"/>
-              </a:spcBef>
-              <a:buNone/>
-            </a:pPr>
-            <a:endParaRPr lang="en-US" dirty="0">
-              <a:solidFill>
-                <a:schemeClr val="tx1"/>
-              </a:solidFill>
-              <a:latin typeface="+mn-lt"/>
-            </a:endParaRPr>
-          </a:p>
-          <a:p>
-            <a:pPr marL="1485900" lvl="3" indent="0">
-              <a:spcBef>
-                <a:spcPts val="0"/>
-              </a:spcBef>
-              <a:buNone/>
-            </a:pPr>
-            <a:endParaRPr lang="en-US" dirty="0">
-              <a:solidFill>
-                <a:schemeClr val="tx1"/>
-              </a:solidFill>
-              <a:latin typeface="+mn-lt"/>
-            </a:endParaRPr>
-          </a:p>
-          <a:p>
-            <a:pPr marL="1485900" lvl="3" indent="0">
-              <a:spcBef>
-                <a:spcPts val="0"/>
-              </a:spcBef>
-              <a:buNone/>
-            </a:pPr>
-            <a:endParaRPr lang="en-US" dirty="0">
-              <a:solidFill>
-                <a:schemeClr val="tx1"/>
-              </a:solidFill>
-              <a:latin typeface="+mn-lt"/>
-            </a:endParaRPr>
-          </a:p>
-          <a:p>
-            <a:pPr marL="1485900" lvl="3" indent="0">
-              <a:spcBef>
-                <a:spcPts val="0"/>
-              </a:spcBef>
-              <a:buNone/>
-            </a:pPr>
-            <a:endParaRPr lang="en-US" dirty="0">
-              <a:solidFill>
-                <a:schemeClr val="tx1"/>
-              </a:solidFill>
+              <a:highlight>
+                <a:srgbClr val="FFFF00"/>
+              </a:highlight>
               <a:latin typeface="+mn-lt"/>
             </a:endParaRPr>
           </a:p>
@@ -18174,10 +18130,10 @@
       </p:sp>
       <p:pic>
         <p:nvPicPr>
-          <p:cNvPr id="14338" name="Picture 2" descr="Image result for golang gopher, images">
+          <p:cNvPr id="1026" name="Picture 2" descr="Image result for golang gopher">
             <a:extLst>
               <a:ext uri="{FF2B5EF4-FFF2-40B4-BE49-F238E27FC236}">
-                <a16:creationId xmlns:a16="http://schemas.microsoft.com/office/drawing/2014/main" id="{99F98B07-359E-7D45-BFB0-9CFB89F92F9B}"/>
+                <a16:creationId xmlns:a16="http://schemas.microsoft.com/office/drawing/2014/main" id="{DD0D59AE-A946-AA4C-A9B1-4092E8A80F5E}"/>
               </a:ext>
             </a:extLst>
           </p:cNvPr>
@@ -18187,7 +18143,7 @@
           <p:nvPr/>
         </p:nvPicPr>
         <p:blipFill>
-          <a:blip r:embed="rId3">
+          <a:blip r:embed="rId2">
             <a:extLst>
               <a:ext uri="{28A0092B-C50C-407E-A947-70E740481C1C}">
                 <a14:useLocalDpi xmlns:a14="http://schemas.microsoft.com/office/drawing/2010/main" val="0"/>
@@ -18201,8 +18157,8 @@
         </p:blipFill>
         <p:spPr bwMode="auto">
           <a:xfrm>
-            <a:off x="3075040" y="3147245"/>
-            <a:ext cx="2603500" cy="3111500"/>
+            <a:off x="7027287" y="2366128"/>
+            <a:ext cx="1328004" cy="1812172"/>
           </a:xfrm>
           <a:prstGeom prst="rect">
             <a:avLst/>
@@ -18222,7 +18178,1867 @@
     </p:spTree>
     <p:extLst>
       <p:ext uri="{BB962C8B-B14F-4D97-AF65-F5344CB8AC3E}">
-        <p14:creationId xmlns:p14="http://schemas.microsoft.com/office/powerpoint/2010/main" val="3120604218"/>
+        <p14:creationId xmlns:p14="http://schemas.microsoft.com/office/powerpoint/2010/main" val="1013099082"/>
+      </p:ext>
+    </p:extLst>
+  </p:cSld>
+  <p:clrMapOvr>
+    <a:masterClrMapping/>
+  </p:clrMapOvr>
+</p:sld>
+</file>
+
+<file path=ppt/slides/slide42.xml><?xml version="1.0" encoding="utf-8"?>
+<p:sld xmlns:a="http://schemas.openxmlformats.org/drawingml/2006/main" xmlns:r="http://schemas.openxmlformats.org/officeDocument/2006/relationships" xmlns:p="http://schemas.openxmlformats.org/presentationml/2006/main">
+  <p:cSld>
+    <p:spTree>
+      <p:nvGrpSpPr>
+        <p:cNvPr id="1" name=""/>
+        <p:cNvGrpSpPr/>
+        <p:nvPr/>
+      </p:nvGrpSpPr>
+      <p:grpSpPr>
+        <a:xfrm>
+          <a:off x="0" y="0"/>
+          <a:ext cx="0" cy="0"/>
+          <a:chOff x="0" y="0"/>
+          <a:chExt cx="0" cy="0"/>
+        </a:xfrm>
+      </p:grpSpPr>
+      <p:sp>
+        <p:nvSpPr>
+          <p:cNvPr id="2" name="Title 1">
+            <a:extLst>
+              <a:ext uri="{FF2B5EF4-FFF2-40B4-BE49-F238E27FC236}">
+                <a16:creationId xmlns:a16="http://schemas.microsoft.com/office/drawing/2014/main" id="{DE3FE848-6F7B-B142-9787-789275D7C4DE}"/>
+              </a:ext>
+            </a:extLst>
+          </p:cNvPr>
+          <p:cNvSpPr>
+            <a:spLocks noGrp="1"/>
+          </p:cNvSpPr>
+          <p:nvPr>
+            <p:ph type="title"/>
+          </p:nvPr>
+        </p:nvSpPr>
+        <p:spPr/>
+        <p:txBody>
+          <a:bodyPr/>
+          <a:lstStyle/>
+          <a:p>
+            <a:r>
+              <a:rPr lang="en-US" dirty="0"/>
+              <a:t>Maps in GO (continued)</a:t>
+            </a:r>
+          </a:p>
+        </p:txBody>
+      </p:sp>
+      <p:sp>
+        <p:nvSpPr>
+          <p:cNvPr id="3" name="Text Placeholder 2">
+            <a:extLst>
+              <a:ext uri="{FF2B5EF4-FFF2-40B4-BE49-F238E27FC236}">
+                <a16:creationId xmlns:a16="http://schemas.microsoft.com/office/drawing/2014/main" id="{929679C0-D617-9241-86A4-6851A95F871E}"/>
+              </a:ext>
+            </a:extLst>
+          </p:cNvPr>
+          <p:cNvSpPr>
+            <a:spLocks noGrp="1"/>
+          </p:cNvSpPr>
+          <p:nvPr>
+            <p:ph type="body" idx="1"/>
+          </p:nvPr>
+        </p:nvSpPr>
+        <p:spPr/>
+        <p:txBody>
+          <a:bodyPr/>
+          <a:lstStyle/>
+          <a:p>
+            <a:r>
+              <a:rPr lang="en-US" dirty="0"/>
+              <a:t> As with other data types, maps can be sub maps, sub-sub maps, and maps of lists.</a:t>
+            </a:r>
+          </a:p>
+          <a:p>
+            <a:endParaRPr lang="en-US" dirty="0"/>
+          </a:p>
+          <a:p>
+            <a:r>
+              <a:rPr lang="en-US" dirty="0"/>
+              <a:t>Again- you can *make* maps with the </a:t>
+            </a:r>
+            <a:r>
+              <a:rPr lang="en-US" b="1" dirty="0"/>
+              <a:t>make</a:t>
+            </a:r>
+            <a:r>
+              <a:rPr lang="en-US" dirty="0"/>
+              <a:t> built-in function so: </a:t>
+            </a:r>
+            <a:r>
+              <a:rPr lang="en-US" dirty="0">
+                <a:highlight>
+                  <a:srgbClr val="FFFF00"/>
+                </a:highlight>
+                <a:latin typeface="American Typewriter" panose="02090604020004020304" pitchFamily="18" charset="77"/>
+              </a:rPr>
+              <a:t>make(map[string]map[</a:t>
+            </a:r>
+            <a:r>
+              <a:rPr lang="en-US" dirty="0" err="1">
+                <a:highlight>
+                  <a:srgbClr val="FFFF00"/>
+                </a:highlight>
+                <a:latin typeface="American Typewriter" panose="02090604020004020304" pitchFamily="18" charset="77"/>
+              </a:rPr>
+              <a:t>int</a:t>
+            </a:r>
+            <a:r>
+              <a:rPr lang="en-US" dirty="0">
+                <a:highlight>
+                  <a:srgbClr val="FFFF00"/>
+                </a:highlight>
+                <a:latin typeface="American Typewriter" panose="02090604020004020304" pitchFamily="18" charset="77"/>
+              </a:rPr>
+              <a:t>]bool)</a:t>
+            </a:r>
+          </a:p>
+        </p:txBody>
+      </p:sp>
+      <p:pic>
+        <p:nvPicPr>
+          <p:cNvPr id="2050" name="Picture 2" descr="Image result for golang gopher">
+            <a:extLst>
+              <a:ext uri="{FF2B5EF4-FFF2-40B4-BE49-F238E27FC236}">
+                <a16:creationId xmlns:a16="http://schemas.microsoft.com/office/drawing/2014/main" id="{7FBABA5C-48B0-7D46-A2DD-798BBEFF555A}"/>
+              </a:ext>
+            </a:extLst>
+          </p:cNvPr>
+          <p:cNvPicPr>
+            <a:picLocks noChangeAspect="1" noChangeArrowheads="1"/>
+          </p:cNvPicPr>
+          <p:nvPr/>
+        </p:nvPicPr>
+        <p:blipFill>
+          <a:blip r:embed="rId2">
+            <a:extLst>
+              <a:ext uri="{28A0092B-C50C-407E-A947-70E740481C1C}">
+                <a14:useLocalDpi xmlns:a14="http://schemas.microsoft.com/office/drawing/2010/main" val="0"/>
+              </a:ext>
+            </a:extLst>
+          </a:blip>
+          <a:srcRect/>
+          <a:stretch>
+            <a:fillRect/>
+          </a:stretch>
+        </p:blipFill>
+        <p:spPr bwMode="auto">
+          <a:xfrm>
+            <a:off x="2240045" y="4126387"/>
+            <a:ext cx="4343400" cy="1866900"/>
+          </a:xfrm>
+          <a:prstGeom prst="rect">
+            <a:avLst/>
+          </a:prstGeom>
+          <a:noFill/>
+          <a:extLst>
+            <a:ext uri="{909E8E84-426E-40DD-AFC4-6F175D3DCCD1}">
+              <a14:hiddenFill xmlns:a14="http://schemas.microsoft.com/office/drawing/2010/main">
+                <a:solidFill>
+                  <a:srgbClr val="FFFFFF"/>
+                </a:solidFill>
+              </a14:hiddenFill>
+            </a:ext>
+          </a:extLst>
+        </p:spPr>
+      </p:pic>
+    </p:spTree>
+    <p:extLst>
+      <p:ext uri="{BB962C8B-B14F-4D97-AF65-F5344CB8AC3E}">
+        <p14:creationId xmlns:p14="http://schemas.microsoft.com/office/powerpoint/2010/main" val="3155058461"/>
+      </p:ext>
+    </p:extLst>
+  </p:cSld>
+  <p:clrMapOvr>
+    <a:masterClrMapping/>
+  </p:clrMapOvr>
+</p:sld>
+</file>
+
+<file path=ppt/slides/slide43.xml><?xml version="1.0" encoding="utf-8"?>
+<p:sld xmlns:a="http://schemas.openxmlformats.org/drawingml/2006/main" xmlns:r="http://schemas.openxmlformats.org/officeDocument/2006/relationships" xmlns:p="http://schemas.openxmlformats.org/presentationml/2006/main">
+  <p:cSld>
+    <p:spTree>
+      <p:nvGrpSpPr>
+        <p:cNvPr id="1" name=""/>
+        <p:cNvGrpSpPr/>
+        <p:nvPr/>
+      </p:nvGrpSpPr>
+      <p:grpSpPr>
+        <a:xfrm>
+          <a:off x="0" y="0"/>
+          <a:ext cx="0" cy="0"/>
+          <a:chOff x="0" y="0"/>
+          <a:chExt cx="0" cy="0"/>
+        </a:xfrm>
+      </p:grpSpPr>
+      <p:sp>
+        <p:nvSpPr>
+          <p:cNvPr id="2" name="Title 1">
+            <a:extLst>
+              <a:ext uri="{FF2B5EF4-FFF2-40B4-BE49-F238E27FC236}">
+                <a16:creationId xmlns:a16="http://schemas.microsoft.com/office/drawing/2014/main" id="{F0A71F30-7997-094F-A603-ADC1FA9F63BA}"/>
+              </a:ext>
+            </a:extLst>
+          </p:cNvPr>
+          <p:cNvSpPr>
+            <a:spLocks noGrp="1"/>
+          </p:cNvSpPr>
+          <p:nvPr>
+            <p:ph type="title"/>
+          </p:nvPr>
+        </p:nvSpPr>
+        <p:spPr/>
+        <p:txBody>
+          <a:bodyPr/>
+          <a:lstStyle/>
+          <a:p>
+            <a:r>
+              <a:rPr lang="en-US" dirty="0"/>
+              <a:t>Structs in GO</a:t>
+            </a:r>
+          </a:p>
+        </p:txBody>
+      </p:sp>
+      <p:sp>
+        <p:nvSpPr>
+          <p:cNvPr id="3" name="Text Placeholder 2">
+            <a:extLst>
+              <a:ext uri="{FF2B5EF4-FFF2-40B4-BE49-F238E27FC236}">
+                <a16:creationId xmlns:a16="http://schemas.microsoft.com/office/drawing/2014/main" id="{3C7A5848-5116-624A-B155-0BED7753AD7F}"/>
+              </a:ext>
+            </a:extLst>
+          </p:cNvPr>
+          <p:cNvSpPr>
+            <a:spLocks noGrp="1"/>
+          </p:cNvSpPr>
+          <p:nvPr>
+            <p:ph type="body" idx="1"/>
+          </p:nvPr>
+        </p:nvSpPr>
+        <p:spPr/>
+        <p:txBody>
+          <a:bodyPr/>
+          <a:lstStyle/>
+          <a:p>
+            <a:r>
+              <a:rPr lang="en-US" dirty="0"/>
+              <a:t> </a:t>
+            </a:r>
+            <a:r>
+              <a:rPr lang="en-US" b="1" dirty="0"/>
+              <a:t>There are no OBJECTS in GO…</a:t>
+            </a:r>
+          </a:p>
+          <a:p>
+            <a:r>
+              <a:rPr lang="en-US" dirty="0"/>
+              <a:t> Instead we have STRUCTS (structures)</a:t>
+            </a:r>
+          </a:p>
+          <a:p>
+            <a:r>
+              <a:rPr lang="en-US" dirty="0"/>
+              <a:t>GO are typed collections of fields. They are useful for grouping data together to form records. SO- whereas where you might use an object in python- in GO we do:</a:t>
+            </a:r>
+          </a:p>
+          <a:p>
+            <a:pPr marL="177800" indent="0">
+              <a:buNone/>
+            </a:pPr>
+            <a:r>
+              <a:rPr lang="en-US" dirty="0">
+                <a:highlight>
+                  <a:srgbClr val="FFFF00"/>
+                </a:highlight>
+                <a:latin typeface="American Typewriter" panose="02090604020004020304" pitchFamily="18" charset="77"/>
+              </a:rPr>
+              <a:t>type person struct {</a:t>
+            </a:r>
+          </a:p>
+          <a:p>
+            <a:pPr marL="177800" indent="0">
+              <a:buNone/>
+            </a:pPr>
+            <a:r>
+              <a:rPr lang="en-US" dirty="0">
+                <a:highlight>
+                  <a:srgbClr val="FFFF00"/>
+                </a:highlight>
+                <a:latin typeface="American Typewriter" panose="02090604020004020304" pitchFamily="18" charset="77"/>
+              </a:rPr>
+              <a:t>	name string</a:t>
+            </a:r>
+          </a:p>
+          <a:p>
+            <a:pPr marL="177800" indent="0">
+              <a:buNone/>
+            </a:pPr>
+            <a:r>
+              <a:rPr lang="en-US" dirty="0">
+                <a:highlight>
+                  <a:srgbClr val="FFFF00"/>
+                </a:highlight>
+                <a:latin typeface="American Typewriter" panose="02090604020004020304" pitchFamily="18" charset="77"/>
+              </a:rPr>
+              <a:t>	age </a:t>
+            </a:r>
+            <a:r>
+              <a:rPr lang="en-US" dirty="0" err="1">
+                <a:highlight>
+                  <a:srgbClr val="FFFF00"/>
+                </a:highlight>
+                <a:latin typeface="American Typewriter" panose="02090604020004020304" pitchFamily="18" charset="77"/>
+              </a:rPr>
+              <a:t>int</a:t>
+            </a:r>
+            <a:endParaRPr lang="en-US" dirty="0">
+              <a:highlight>
+                <a:srgbClr val="FFFF00"/>
+              </a:highlight>
+              <a:latin typeface="American Typewriter" panose="02090604020004020304" pitchFamily="18" charset="77"/>
+            </a:endParaRPr>
+          </a:p>
+          <a:p>
+            <a:pPr marL="177800" indent="0">
+              <a:buNone/>
+            </a:pPr>
+            <a:r>
+              <a:rPr lang="en-US" dirty="0">
+                <a:highlight>
+                  <a:srgbClr val="FFFF00"/>
+                </a:highlight>
+                <a:latin typeface="American Typewriter" panose="02090604020004020304" pitchFamily="18" charset="77"/>
+              </a:rPr>
+              <a:t>}</a:t>
+            </a:r>
+          </a:p>
+        </p:txBody>
+      </p:sp>
+      <p:pic>
+        <p:nvPicPr>
+          <p:cNvPr id="3074" name="Picture 2" descr="Image result for golang gopher">
+            <a:extLst>
+              <a:ext uri="{FF2B5EF4-FFF2-40B4-BE49-F238E27FC236}">
+                <a16:creationId xmlns:a16="http://schemas.microsoft.com/office/drawing/2014/main" id="{874B6858-7AAE-AF46-8B41-24BDBDE56C14}"/>
+              </a:ext>
+            </a:extLst>
+          </p:cNvPr>
+          <p:cNvPicPr>
+            <a:picLocks noChangeAspect="1" noChangeArrowheads="1"/>
+          </p:cNvPicPr>
+          <p:nvPr/>
+        </p:nvPicPr>
+        <p:blipFill>
+          <a:blip r:embed="rId2">
+            <a:extLst>
+              <a:ext uri="{28A0092B-C50C-407E-A947-70E740481C1C}">
+                <a14:useLocalDpi xmlns:a14="http://schemas.microsoft.com/office/drawing/2010/main" val="0"/>
+              </a:ext>
+            </a:extLst>
+          </a:blip>
+          <a:srcRect/>
+          <a:stretch>
+            <a:fillRect/>
+          </a:stretch>
+        </p:blipFill>
+        <p:spPr bwMode="auto">
+          <a:xfrm>
+            <a:off x="5203595" y="3806071"/>
+            <a:ext cx="2729649" cy="2729649"/>
+          </a:xfrm>
+          <a:prstGeom prst="rect">
+            <a:avLst/>
+          </a:prstGeom>
+          <a:noFill/>
+          <a:extLst>
+            <a:ext uri="{909E8E84-426E-40DD-AFC4-6F175D3DCCD1}">
+              <a14:hiddenFill xmlns:a14="http://schemas.microsoft.com/office/drawing/2010/main">
+                <a:solidFill>
+                  <a:srgbClr val="FFFFFF"/>
+                </a:solidFill>
+              </a14:hiddenFill>
+            </a:ext>
+          </a:extLst>
+        </p:spPr>
+      </p:pic>
+    </p:spTree>
+    <p:extLst>
+      <p:ext uri="{BB962C8B-B14F-4D97-AF65-F5344CB8AC3E}">
+        <p14:creationId xmlns:p14="http://schemas.microsoft.com/office/powerpoint/2010/main" val="3070442363"/>
+      </p:ext>
+    </p:extLst>
+  </p:cSld>
+  <p:clrMapOvr>
+    <a:masterClrMapping/>
+  </p:clrMapOvr>
+</p:sld>
+</file>
+
+<file path=ppt/slides/slide44.xml><?xml version="1.0" encoding="utf-8"?>
+<p:sld xmlns:a="http://schemas.openxmlformats.org/drawingml/2006/main" xmlns:r="http://schemas.openxmlformats.org/officeDocument/2006/relationships" xmlns:p="http://schemas.openxmlformats.org/presentationml/2006/main">
+  <p:cSld>
+    <p:spTree>
+      <p:nvGrpSpPr>
+        <p:cNvPr id="1" name=""/>
+        <p:cNvGrpSpPr/>
+        <p:nvPr/>
+      </p:nvGrpSpPr>
+      <p:grpSpPr>
+        <a:xfrm>
+          <a:off x="0" y="0"/>
+          <a:ext cx="0" cy="0"/>
+          <a:chOff x="0" y="0"/>
+          <a:chExt cx="0" cy="0"/>
+        </a:xfrm>
+      </p:grpSpPr>
+      <p:sp>
+        <p:nvSpPr>
+          <p:cNvPr id="2" name="Title 1">
+            <a:extLst>
+              <a:ext uri="{FF2B5EF4-FFF2-40B4-BE49-F238E27FC236}">
+                <a16:creationId xmlns:a16="http://schemas.microsoft.com/office/drawing/2014/main" id="{E0CB790C-B006-0C47-81A8-22397CDC3407}"/>
+              </a:ext>
+            </a:extLst>
+          </p:cNvPr>
+          <p:cNvSpPr>
+            <a:spLocks noGrp="1"/>
+          </p:cNvSpPr>
+          <p:nvPr>
+            <p:ph type="title"/>
+          </p:nvPr>
+        </p:nvSpPr>
+        <p:spPr/>
+        <p:txBody>
+          <a:bodyPr/>
+          <a:lstStyle/>
+          <a:p>
+            <a:r>
+              <a:rPr lang="en-US" dirty="0"/>
+              <a:t>Structs in Go</a:t>
+            </a:r>
+          </a:p>
+        </p:txBody>
+      </p:sp>
+      <p:sp>
+        <p:nvSpPr>
+          <p:cNvPr id="3" name="Text Placeholder 2">
+            <a:extLst>
+              <a:ext uri="{FF2B5EF4-FFF2-40B4-BE49-F238E27FC236}">
+                <a16:creationId xmlns:a16="http://schemas.microsoft.com/office/drawing/2014/main" id="{DD0FAD81-74EF-B248-9BAE-8B367BB8BDBE}"/>
+              </a:ext>
+            </a:extLst>
+          </p:cNvPr>
+          <p:cNvSpPr>
+            <a:spLocks noGrp="1"/>
+          </p:cNvSpPr>
+          <p:nvPr>
+            <p:ph type="body" idx="1"/>
+          </p:nvPr>
+        </p:nvSpPr>
+        <p:spPr/>
+        <p:txBody>
+          <a:bodyPr/>
+          <a:lstStyle/>
+          <a:p>
+            <a:r>
+              <a:rPr lang="en-US" dirty="0"/>
+              <a:t> Think of structs are like the abstract object definition</a:t>
+            </a:r>
+          </a:p>
+          <a:p>
+            <a:r>
+              <a:rPr lang="en-US" dirty="0"/>
+              <a:t> To instantiate we just use </a:t>
+            </a:r>
+            <a:r>
+              <a:rPr lang="en-US" i="1" dirty="0" err="1"/>
+              <a:t>struct_name</a:t>
+            </a:r>
+            <a:r>
+              <a:rPr lang="en-US" i="1" dirty="0"/>
+              <a:t>(inputs)…</a:t>
+            </a:r>
+            <a:r>
+              <a:rPr lang="en-US" dirty="0"/>
+              <a:t>so:</a:t>
+            </a:r>
+          </a:p>
+          <a:p>
+            <a:endParaRPr lang="en-US" dirty="0"/>
+          </a:p>
+          <a:p>
+            <a:pPr marL="603250" lvl="1" indent="0">
+              <a:buNone/>
+            </a:pPr>
+            <a:r>
+              <a:rPr lang="en-US" dirty="0">
+                <a:highlight>
+                  <a:srgbClr val="FFFF00"/>
+                </a:highlight>
+              </a:rPr>
+              <a:t>person{ “name”: ”Mark”, ”age”: 20 }</a:t>
+            </a:r>
+          </a:p>
+          <a:p>
+            <a:pPr marL="603250" lvl="1" indent="0">
+              <a:buNone/>
+            </a:pPr>
+            <a:r>
+              <a:rPr lang="en-US" dirty="0">
+                <a:highlight>
+                  <a:srgbClr val="FFFF00"/>
+                </a:highlight>
+              </a:rPr>
+              <a:t>or</a:t>
+            </a:r>
+          </a:p>
+          <a:p>
+            <a:pPr marL="603250" lvl="1" indent="0">
+              <a:buNone/>
+            </a:pPr>
+            <a:r>
+              <a:rPr lang="en-US" dirty="0">
+                <a:highlight>
+                  <a:srgbClr val="FFFF00"/>
+                </a:highlight>
+              </a:rPr>
+              <a:t>person{“name”: “Lisa”, 23 } //Note that we don’t need the index</a:t>
+            </a:r>
+          </a:p>
+          <a:p>
+            <a:pPr marL="603250" lvl="1" indent="0">
+              <a:buNone/>
+            </a:pPr>
+            <a:r>
+              <a:rPr lang="en-US" dirty="0">
+                <a:highlight>
+                  <a:srgbClr val="FFFF00"/>
+                </a:highlight>
+              </a:rPr>
+              <a:t>or </a:t>
+            </a:r>
+          </a:p>
+          <a:p>
+            <a:pPr marL="603250" lvl="1" indent="0">
+              <a:buNone/>
+            </a:pPr>
+            <a:r>
+              <a:rPr lang="en-US" dirty="0">
+                <a:highlight>
+                  <a:srgbClr val="FFFF00"/>
+                </a:highlight>
+              </a:rPr>
+              <a:t>a := person{“name”: “Johnny”, age: “Unknown” }</a:t>
+            </a:r>
+          </a:p>
+          <a:p>
+            <a:pPr marL="603250" lvl="1" indent="0">
+              <a:buNone/>
+            </a:pPr>
+            <a:endParaRPr lang="en-US" dirty="0">
+              <a:highlight>
+                <a:srgbClr val="FFFF00"/>
+              </a:highlight>
+            </a:endParaRPr>
+          </a:p>
+          <a:p>
+            <a:pPr marL="603250" lvl="1" indent="0">
+              <a:buNone/>
+            </a:pPr>
+            <a:r>
+              <a:rPr lang="en-US" dirty="0" err="1">
+                <a:highlight>
+                  <a:srgbClr val="FFFF00"/>
+                </a:highlight>
+              </a:rPr>
+              <a:t>fmt.Println</a:t>
+            </a:r>
+            <a:r>
+              <a:rPr lang="en-US" dirty="0">
+                <a:highlight>
+                  <a:srgbClr val="FFFF00"/>
+                </a:highlight>
+              </a:rPr>
+              <a:t>(”How old is Johnny?”, </a:t>
+            </a:r>
+            <a:r>
+              <a:rPr lang="en-US" dirty="0" err="1">
+                <a:highlight>
+                  <a:srgbClr val="FFFF00"/>
+                </a:highlight>
+              </a:rPr>
+              <a:t>a.age</a:t>
+            </a:r>
+            <a:r>
+              <a:rPr lang="en-US" dirty="0">
+                <a:highlight>
+                  <a:srgbClr val="FFFF00"/>
+                </a:highlight>
+              </a:rPr>
+              <a:t>)</a:t>
+            </a:r>
+          </a:p>
+        </p:txBody>
+      </p:sp>
+      <p:pic>
+        <p:nvPicPr>
+          <p:cNvPr id="4098" name="Picture 2" descr="Image result for golang gopher">
+            <a:extLst>
+              <a:ext uri="{FF2B5EF4-FFF2-40B4-BE49-F238E27FC236}">
+                <a16:creationId xmlns:a16="http://schemas.microsoft.com/office/drawing/2014/main" id="{9252CB0C-F216-1244-BE3C-BD249833A250}"/>
+              </a:ext>
+            </a:extLst>
+          </p:cNvPr>
+          <p:cNvPicPr>
+            <a:picLocks noChangeAspect="1" noChangeArrowheads="1"/>
+          </p:cNvPicPr>
+          <p:nvPr/>
+        </p:nvPicPr>
+        <p:blipFill>
+          <a:blip r:embed="rId2">
+            <a:extLst>
+              <a:ext uri="{28A0092B-C50C-407E-A947-70E740481C1C}">
+                <a14:useLocalDpi xmlns:a14="http://schemas.microsoft.com/office/drawing/2010/main" val="0"/>
+              </a:ext>
+            </a:extLst>
+          </a:blip>
+          <a:srcRect/>
+          <a:stretch>
+            <a:fillRect/>
+          </a:stretch>
+        </p:blipFill>
+        <p:spPr bwMode="auto">
+          <a:xfrm>
+            <a:off x="6989930" y="4901937"/>
+            <a:ext cx="1795590" cy="1498861"/>
+          </a:xfrm>
+          <a:prstGeom prst="rect">
+            <a:avLst/>
+          </a:prstGeom>
+          <a:noFill/>
+          <a:extLst>
+            <a:ext uri="{909E8E84-426E-40DD-AFC4-6F175D3DCCD1}">
+              <a14:hiddenFill xmlns:a14="http://schemas.microsoft.com/office/drawing/2010/main">
+                <a:solidFill>
+                  <a:srgbClr val="FFFFFF"/>
+                </a:solidFill>
+              </a14:hiddenFill>
+            </a:ext>
+          </a:extLst>
+        </p:spPr>
+      </p:pic>
+    </p:spTree>
+    <p:extLst>
+      <p:ext uri="{BB962C8B-B14F-4D97-AF65-F5344CB8AC3E}">
+        <p14:creationId xmlns:p14="http://schemas.microsoft.com/office/powerpoint/2010/main" val="2090657355"/>
+      </p:ext>
+    </p:extLst>
+  </p:cSld>
+  <p:clrMapOvr>
+    <a:masterClrMapping/>
+  </p:clrMapOvr>
+</p:sld>
+</file>
+
+<file path=ppt/slides/slide45.xml><?xml version="1.0" encoding="utf-8"?>
+<p:sld xmlns:a="http://schemas.openxmlformats.org/drawingml/2006/main" xmlns:r="http://schemas.openxmlformats.org/officeDocument/2006/relationships" xmlns:p="http://schemas.openxmlformats.org/presentationml/2006/main">
+  <p:cSld>
+    <p:spTree>
+      <p:nvGrpSpPr>
+        <p:cNvPr id="1" name=""/>
+        <p:cNvGrpSpPr/>
+        <p:nvPr/>
+      </p:nvGrpSpPr>
+      <p:grpSpPr>
+        <a:xfrm>
+          <a:off x="0" y="0"/>
+          <a:ext cx="0" cy="0"/>
+          <a:chOff x="0" y="0"/>
+          <a:chExt cx="0" cy="0"/>
+        </a:xfrm>
+      </p:grpSpPr>
+      <p:sp>
+        <p:nvSpPr>
+          <p:cNvPr id="2" name="Title 1">
+            <a:extLst>
+              <a:ext uri="{FF2B5EF4-FFF2-40B4-BE49-F238E27FC236}">
+                <a16:creationId xmlns:a16="http://schemas.microsoft.com/office/drawing/2014/main" id="{8E6BE4E9-2AFC-8D4C-8B51-8744772248C3}"/>
+              </a:ext>
+            </a:extLst>
+          </p:cNvPr>
+          <p:cNvSpPr>
+            <a:spLocks noGrp="1"/>
+          </p:cNvSpPr>
+          <p:nvPr>
+            <p:ph type="title"/>
+          </p:nvPr>
+        </p:nvSpPr>
+        <p:spPr/>
+        <p:txBody>
+          <a:bodyPr/>
+          <a:lstStyle/>
+          <a:p>
+            <a:r>
+              <a:rPr lang="en-US" dirty="0"/>
+              <a:t>Structs in Go (continued)</a:t>
+            </a:r>
+          </a:p>
+        </p:txBody>
+      </p:sp>
+      <p:sp>
+        <p:nvSpPr>
+          <p:cNvPr id="3" name="Text Placeholder 2">
+            <a:extLst>
+              <a:ext uri="{FF2B5EF4-FFF2-40B4-BE49-F238E27FC236}">
+                <a16:creationId xmlns:a16="http://schemas.microsoft.com/office/drawing/2014/main" id="{2B441710-1323-4240-B057-42AD25B9EDA9}"/>
+              </a:ext>
+            </a:extLst>
+          </p:cNvPr>
+          <p:cNvSpPr>
+            <a:spLocks noGrp="1"/>
+          </p:cNvSpPr>
+          <p:nvPr>
+            <p:ph type="body" idx="1"/>
+          </p:nvPr>
+        </p:nvSpPr>
+        <p:spPr/>
+        <p:txBody>
+          <a:bodyPr/>
+          <a:lstStyle/>
+          <a:p>
+            <a:r>
+              <a:rPr lang="en-US" dirty="0"/>
+              <a:t> As with other items- structs can contain other structs and any data type. They can even contain functions (as you will see in your lab)</a:t>
+            </a:r>
+          </a:p>
+        </p:txBody>
+      </p:sp>
+      <p:pic>
+        <p:nvPicPr>
+          <p:cNvPr id="5122" name="Picture 2" descr="Image result for golang gopher">
+            <a:extLst>
+              <a:ext uri="{FF2B5EF4-FFF2-40B4-BE49-F238E27FC236}">
+                <a16:creationId xmlns:a16="http://schemas.microsoft.com/office/drawing/2014/main" id="{D45817FE-DC33-E446-9181-4E615A1225D0}"/>
+              </a:ext>
+            </a:extLst>
+          </p:cNvPr>
+          <p:cNvPicPr>
+            <a:picLocks noChangeAspect="1" noChangeArrowheads="1"/>
+          </p:cNvPicPr>
+          <p:nvPr/>
+        </p:nvPicPr>
+        <p:blipFill>
+          <a:blip r:embed="rId2">
+            <a:extLst>
+              <a:ext uri="{28A0092B-C50C-407E-A947-70E740481C1C}">
+                <a14:useLocalDpi xmlns:a14="http://schemas.microsoft.com/office/drawing/2010/main" val="0"/>
+              </a:ext>
+            </a:extLst>
+          </a:blip>
+          <a:srcRect/>
+          <a:stretch>
+            <a:fillRect/>
+          </a:stretch>
+        </p:blipFill>
+        <p:spPr bwMode="auto">
+          <a:xfrm>
+            <a:off x="3225800" y="3114904"/>
+            <a:ext cx="2692400" cy="3022600"/>
+          </a:xfrm>
+          <a:prstGeom prst="rect">
+            <a:avLst/>
+          </a:prstGeom>
+          <a:noFill/>
+          <a:extLst>
+            <a:ext uri="{909E8E84-426E-40DD-AFC4-6F175D3DCCD1}">
+              <a14:hiddenFill xmlns:a14="http://schemas.microsoft.com/office/drawing/2010/main">
+                <a:solidFill>
+                  <a:srgbClr val="FFFFFF"/>
+                </a:solidFill>
+              </a14:hiddenFill>
+            </a:ext>
+          </a:extLst>
+        </p:spPr>
+      </p:pic>
+    </p:spTree>
+    <p:extLst>
+      <p:ext uri="{BB962C8B-B14F-4D97-AF65-F5344CB8AC3E}">
+        <p14:creationId xmlns:p14="http://schemas.microsoft.com/office/powerpoint/2010/main" val="3474161179"/>
+      </p:ext>
+    </p:extLst>
+  </p:cSld>
+  <p:clrMapOvr>
+    <a:masterClrMapping/>
+  </p:clrMapOvr>
+</p:sld>
+</file>
+
+<file path=ppt/slides/slide46.xml><?xml version="1.0" encoding="utf-8"?>
+<p:sld xmlns:a="http://schemas.openxmlformats.org/drawingml/2006/main" xmlns:r="http://schemas.openxmlformats.org/officeDocument/2006/relationships" xmlns:p="http://schemas.openxmlformats.org/presentationml/2006/main">
+  <p:cSld>
+    <p:spTree>
+      <p:nvGrpSpPr>
+        <p:cNvPr id="1" name=""/>
+        <p:cNvGrpSpPr/>
+        <p:nvPr/>
+      </p:nvGrpSpPr>
+      <p:grpSpPr>
+        <a:xfrm>
+          <a:off x="0" y="0"/>
+          <a:ext cx="0" cy="0"/>
+          <a:chOff x="0" y="0"/>
+          <a:chExt cx="0" cy="0"/>
+        </a:xfrm>
+      </p:grpSpPr>
+      <p:sp>
+        <p:nvSpPr>
+          <p:cNvPr id="2" name="Title 1">
+            <a:extLst>
+              <a:ext uri="{FF2B5EF4-FFF2-40B4-BE49-F238E27FC236}">
+                <a16:creationId xmlns:a16="http://schemas.microsoft.com/office/drawing/2014/main" id="{9A9C5AAE-FF27-0A4F-BE73-02B3F4FE1C84}"/>
+              </a:ext>
+            </a:extLst>
+          </p:cNvPr>
+          <p:cNvSpPr>
+            <a:spLocks noGrp="1"/>
+          </p:cNvSpPr>
+          <p:nvPr>
+            <p:ph type="title"/>
+          </p:nvPr>
+        </p:nvSpPr>
+        <p:spPr/>
+        <p:txBody>
+          <a:bodyPr/>
+          <a:lstStyle/>
+          <a:p>
+            <a:r>
+              <a:rPr lang="en-US" dirty="0"/>
+              <a:t>Go Structs (continued some more)</a:t>
+            </a:r>
+          </a:p>
+        </p:txBody>
+      </p:sp>
+      <p:sp>
+        <p:nvSpPr>
+          <p:cNvPr id="3" name="Text Placeholder 2">
+            <a:extLst>
+              <a:ext uri="{FF2B5EF4-FFF2-40B4-BE49-F238E27FC236}">
+                <a16:creationId xmlns:a16="http://schemas.microsoft.com/office/drawing/2014/main" id="{B811DF19-814D-2B4B-98DE-8FA8E1974F15}"/>
+              </a:ext>
+            </a:extLst>
+          </p:cNvPr>
+          <p:cNvSpPr>
+            <a:spLocks noGrp="1"/>
+          </p:cNvSpPr>
+          <p:nvPr>
+            <p:ph type="body" idx="1"/>
+          </p:nvPr>
+        </p:nvSpPr>
+        <p:spPr/>
+        <p:txBody>
+          <a:bodyPr/>
+          <a:lstStyle/>
+          <a:p>
+            <a:r>
+              <a:rPr lang="en-US" dirty="0"/>
+              <a:t> So you might be thinking “Yeah- well if structs are basically OBJECTS- how do I run FUNCTIONS against them?!?”</a:t>
+            </a:r>
+          </a:p>
+          <a:p>
+            <a:r>
+              <a:rPr lang="en-US" dirty="0"/>
+              <a:t> Glad you asked! Let’s take a quick look at how to reference a struct!</a:t>
+            </a:r>
+          </a:p>
+        </p:txBody>
+      </p:sp>
+      <p:pic>
+        <p:nvPicPr>
+          <p:cNvPr id="6146" name="Picture 2" descr="Image result for golang gopher">
+            <a:extLst>
+              <a:ext uri="{FF2B5EF4-FFF2-40B4-BE49-F238E27FC236}">
+                <a16:creationId xmlns:a16="http://schemas.microsoft.com/office/drawing/2014/main" id="{5F0288C4-4AB2-FA49-B025-049A86FB8178}"/>
+              </a:ext>
+            </a:extLst>
+          </p:cNvPr>
+          <p:cNvPicPr>
+            <a:picLocks noChangeAspect="1" noChangeArrowheads="1"/>
+          </p:cNvPicPr>
+          <p:nvPr/>
+        </p:nvPicPr>
+        <p:blipFill>
+          <a:blip r:embed="rId2">
+            <a:extLst>
+              <a:ext uri="{28A0092B-C50C-407E-A947-70E740481C1C}">
+                <a14:useLocalDpi xmlns:a14="http://schemas.microsoft.com/office/drawing/2010/main" val="0"/>
+              </a:ext>
+            </a:extLst>
+          </a:blip>
+          <a:srcRect/>
+          <a:stretch>
+            <a:fillRect/>
+          </a:stretch>
+        </p:blipFill>
+        <p:spPr bwMode="auto">
+          <a:xfrm>
+            <a:off x="3469063" y="3865838"/>
+            <a:ext cx="2127839" cy="2681077"/>
+          </a:xfrm>
+          <a:prstGeom prst="rect">
+            <a:avLst/>
+          </a:prstGeom>
+          <a:noFill/>
+          <a:extLst>
+            <a:ext uri="{909E8E84-426E-40DD-AFC4-6F175D3DCCD1}">
+              <a14:hiddenFill xmlns:a14="http://schemas.microsoft.com/office/drawing/2010/main">
+                <a:solidFill>
+                  <a:srgbClr val="FFFFFF"/>
+                </a:solidFill>
+              </a14:hiddenFill>
+            </a:ext>
+          </a:extLst>
+        </p:spPr>
+      </p:pic>
+    </p:spTree>
+    <p:extLst>
+      <p:ext uri="{BB962C8B-B14F-4D97-AF65-F5344CB8AC3E}">
+        <p14:creationId xmlns:p14="http://schemas.microsoft.com/office/powerpoint/2010/main" val="865624864"/>
+      </p:ext>
+    </p:extLst>
+  </p:cSld>
+  <p:clrMapOvr>
+    <a:masterClrMapping/>
+  </p:clrMapOvr>
+</p:sld>
+</file>
+
+<file path=ppt/slides/slide47.xml><?xml version="1.0" encoding="utf-8"?>
+<p:sld xmlns:a="http://schemas.openxmlformats.org/drawingml/2006/main" xmlns:r="http://schemas.openxmlformats.org/officeDocument/2006/relationships" xmlns:p="http://schemas.openxmlformats.org/presentationml/2006/main">
+  <p:cSld>
+    <p:spTree>
+      <p:nvGrpSpPr>
+        <p:cNvPr id="1" name=""/>
+        <p:cNvGrpSpPr/>
+        <p:nvPr/>
+      </p:nvGrpSpPr>
+      <p:grpSpPr>
+        <a:xfrm>
+          <a:off x="0" y="0"/>
+          <a:ext cx="0" cy="0"/>
+          <a:chOff x="0" y="0"/>
+          <a:chExt cx="0" cy="0"/>
+        </a:xfrm>
+      </p:grpSpPr>
+      <p:sp>
+        <p:nvSpPr>
+          <p:cNvPr id="2" name="Title 1">
+            <a:extLst>
+              <a:ext uri="{FF2B5EF4-FFF2-40B4-BE49-F238E27FC236}">
+                <a16:creationId xmlns:a16="http://schemas.microsoft.com/office/drawing/2014/main" id="{9A9C5AAE-FF27-0A4F-BE73-02B3F4FE1C84}"/>
+              </a:ext>
+            </a:extLst>
+          </p:cNvPr>
+          <p:cNvSpPr>
+            <a:spLocks noGrp="1"/>
+          </p:cNvSpPr>
+          <p:nvPr>
+            <p:ph type="title"/>
+          </p:nvPr>
+        </p:nvSpPr>
+        <p:spPr/>
+        <p:txBody>
+          <a:bodyPr/>
+          <a:lstStyle/>
+          <a:p>
+            <a:r>
+              <a:rPr lang="en-US" dirty="0"/>
+              <a:t>Go Structs (continued some more)</a:t>
+            </a:r>
+          </a:p>
+        </p:txBody>
+      </p:sp>
+      <p:sp>
+        <p:nvSpPr>
+          <p:cNvPr id="3" name="Text Placeholder 2">
+            <a:extLst>
+              <a:ext uri="{FF2B5EF4-FFF2-40B4-BE49-F238E27FC236}">
+                <a16:creationId xmlns:a16="http://schemas.microsoft.com/office/drawing/2014/main" id="{B811DF19-814D-2B4B-98DE-8FA8E1974F15}"/>
+              </a:ext>
+            </a:extLst>
+          </p:cNvPr>
+          <p:cNvSpPr>
+            <a:spLocks noGrp="1"/>
+          </p:cNvSpPr>
+          <p:nvPr>
+            <p:ph type="body" idx="1"/>
+          </p:nvPr>
+        </p:nvSpPr>
+        <p:spPr/>
+        <p:txBody>
+          <a:bodyPr/>
+          <a:lstStyle/>
+          <a:p>
+            <a:r>
+              <a:rPr lang="en-US" dirty="0"/>
+              <a:t> So you might be thinking “Yeah- well if structs are basically OBJECTS- how do I run FUNCTIONS against them?!?”</a:t>
+            </a:r>
+          </a:p>
+          <a:p>
+            <a:r>
+              <a:rPr lang="en-US" dirty="0"/>
+              <a:t> Glad you asked! Let’s take a quick look at how to reference a struct!</a:t>
+            </a:r>
+          </a:p>
+        </p:txBody>
+      </p:sp>
+      <p:pic>
+        <p:nvPicPr>
+          <p:cNvPr id="7170" name="Picture 2" descr="Image result for golang gopher">
+            <a:extLst>
+              <a:ext uri="{FF2B5EF4-FFF2-40B4-BE49-F238E27FC236}">
+                <a16:creationId xmlns:a16="http://schemas.microsoft.com/office/drawing/2014/main" id="{3FEC9AD2-E22D-3F41-99EC-240A91B07651}"/>
+              </a:ext>
+            </a:extLst>
+          </p:cNvPr>
+          <p:cNvPicPr>
+            <a:picLocks noChangeAspect="1" noChangeArrowheads="1"/>
+          </p:cNvPicPr>
+          <p:nvPr/>
+        </p:nvPicPr>
+        <p:blipFill>
+          <a:blip r:embed="rId2">
+            <a:extLst>
+              <a:ext uri="{28A0092B-C50C-407E-A947-70E740481C1C}">
+                <a14:useLocalDpi xmlns:a14="http://schemas.microsoft.com/office/drawing/2010/main" val="0"/>
+              </a:ext>
+            </a:extLst>
+          </a:blip>
+          <a:srcRect/>
+          <a:stretch>
+            <a:fillRect/>
+          </a:stretch>
+        </p:blipFill>
+        <p:spPr bwMode="auto">
+          <a:xfrm>
+            <a:off x="2979328" y="3754224"/>
+            <a:ext cx="2959100" cy="2743200"/>
+          </a:xfrm>
+          <a:prstGeom prst="rect">
+            <a:avLst/>
+          </a:prstGeom>
+          <a:noFill/>
+          <a:extLst>
+            <a:ext uri="{909E8E84-426E-40DD-AFC4-6F175D3DCCD1}">
+              <a14:hiddenFill xmlns:a14="http://schemas.microsoft.com/office/drawing/2010/main">
+                <a:solidFill>
+                  <a:srgbClr val="FFFFFF"/>
+                </a:solidFill>
+              </a14:hiddenFill>
+            </a:ext>
+          </a:extLst>
+        </p:spPr>
+      </p:pic>
+    </p:spTree>
+    <p:extLst>
+      <p:ext uri="{BB962C8B-B14F-4D97-AF65-F5344CB8AC3E}">
+        <p14:creationId xmlns:p14="http://schemas.microsoft.com/office/powerpoint/2010/main" val="1138603081"/>
+      </p:ext>
+    </p:extLst>
+  </p:cSld>
+  <p:clrMapOvr>
+    <a:masterClrMapping/>
+  </p:clrMapOvr>
+</p:sld>
+</file>
+
+<file path=ppt/slides/slide48.xml><?xml version="1.0" encoding="utf-8"?>
+<p:sld xmlns:a="http://schemas.openxmlformats.org/drawingml/2006/main" xmlns:r="http://schemas.openxmlformats.org/officeDocument/2006/relationships" xmlns:p="http://schemas.openxmlformats.org/presentationml/2006/main">
+  <p:cSld>
+    <p:spTree>
+      <p:nvGrpSpPr>
+        <p:cNvPr id="1" name=""/>
+        <p:cNvGrpSpPr/>
+        <p:nvPr/>
+      </p:nvGrpSpPr>
+      <p:grpSpPr>
+        <a:xfrm>
+          <a:off x="0" y="0"/>
+          <a:ext cx="0" cy="0"/>
+          <a:chOff x="0" y="0"/>
+          <a:chExt cx="0" cy="0"/>
+        </a:xfrm>
+      </p:grpSpPr>
+      <p:sp>
+        <p:nvSpPr>
+          <p:cNvPr id="2" name="Title 1">
+            <a:extLst>
+              <a:ext uri="{FF2B5EF4-FFF2-40B4-BE49-F238E27FC236}">
+                <a16:creationId xmlns:a16="http://schemas.microsoft.com/office/drawing/2014/main" id="{3D44C771-577D-4E47-9637-6A35C6A119FB}"/>
+              </a:ext>
+            </a:extLst>
+          </p:cNvPr>
+          <p:cNvSpPr>
+            <a:spLocks noGrp="1"/>
+          </p:cNvSpPr>
+          <p:nvPr>
+            <p:ph type="title"/>
+          </p:nvPr>
+        </p:nvSpPr>
+        <p:spPr/>
+        <p:txBody>
+          <a:bodyPr/>
+          <a:lstStyle/>
+          <a:p>
+            <a:r>
+              <a:rPr lang="en-US" dirty="0"/>
+              <a:t>Go Structs some more</a:t>
+            </a:r>
+          </a:p>
+        </p:txBody>
+      </p:sp>
+      <p:sp>
+        <p:nvSpPr>
+          <p:cNvPr id="3" name="Text Placeholder 2">
+            <a:extLst>
+              <a:ext uri="{FF2B5EF4-FFF2-40B4-BE49-F238E27FC236}">
+                <a16:creationId xmlns:a16="http://schemas.microsoft.com/office/drawing/2014/main" id="{DC52AFC4-A676-AB4A-AD15-5B865FDB5958}"/>
+              </a:ext>
+            </a:extLst>
+          </p:cNvPr>
+          <p:cNvSpPr>
+            <a:spLocks noGrp="1"/>
+          </p:cNvSpPr>
+          <p:nvPr>
+            <p:ph type="body" idx="1"/>
+          </p:nvPr>
+        </p:nvSpPr>
+        <p:spPr/>
+        <p:txBody>
+          <a:bodyPr/>
+          <a:lstStyle/>
+          <a:p>
+            <a:r>
+              <a:rPr lang="en-US" dirty="0"/>
+              <a:t> We have functions work on structs using </a:t>
+            </a:r>
+            <a:r>
+              <a:rPr lang="en-US" b="1" dirty="0"/>
+              <a:t>receiver</a:t>
+            </a:r>
+            <a:r>
+              <a:rPr lang="en-US" dirty="0"/>
+              <a:t> functions that point </a:t>
+            </a:r>
+            <a:r>
+              <a:rPr lang="en-US" b="1" dirty="0"/>
+              <a:t>back</a:t>
+            </a:r>
+            <a:r>
+              <a:rPr lang="en-US" dirty="0"/>
+              <a:t> to our structs</a:t>
+            </a:r>
+          </a:p>
+          <a:p>
+            <a:r>
+              <a:rPr lang="en-US" dirty="0"/>
+              <a:t> Consider a “</a:t>
+            </a:r>
+            <a:r>
+              <a:rPr lang="en-US" dirty="0" err="1"/>
+              <a:t>rect</a:t>
+            </a:r>
+            <a:r>
+              <a:rPr lang="en-US" dirty="0"/>
+              <a:t>” struct with a width and height:</a:t>
+            </a:r>
+          </a:p>
+          <a:p>
+            <a:pPr marL="177800" indent="0">
+              <a:buNone/>
+            </a:pPr>
+            <a:r>
+              <a:rPr lang="en-US" sz="2400" dirty="0">
+                <a:highlight>
+                  <a:srgbClr val="FFFF00"/>
+                </a:highlight>
+                <a:latin typeface="American Typewriter" panose="02090604020004020304" pitchFamily="18" charset="77"/>
+              </a:rPr>
+              <a:t>type </a:t>
+            </a:r>
+            <a:r>
+              <a:rPr lang="en-US" sz="2400" dirty="0" err="1">
+                <a:highlight>
+                  <a:srgbClr val="FFFF00"/>
+                </a:highlight>
+                <a:latin typeface="American Typewriter" panose="02090604020004020304" pitchFamily="18" charset="77"/>
+              </a:rPr>
+              <a:t>rect</a:t>
+            </a:r>
+            <a:r>
+              <a:rPr lang="en-US" sz="2400" dirty="0">
+                <a:highlight>
+                  <a:srgbClr val="FFFF00"/>
+                </a:highlight>
+                <a:latin typeface="American Typewriter" panose="02090604020004020304" pitchFamily="18" charset="77"/>
+              </a:rPr>
+              <a:t> struct {</a:t>
+            </a:r>
+          </a:p>
+          <a:p>
+            <a:pPr marL="177800" indent="0">
+              <a:buNone/>
+            </a:pPr>
+            <a:r>
+              <a:rPr lang="en-US" sz="2400" dirty="0">
+                <a:highlight>
+                  <a:srgbClr val="FFFF00"/>
+                </a:highlight>
+                <a:latin typeface="American Typewriter" panose="02090604020004020304" pitchFamily="18" charset="77"/>
+              </a:rPr>
+              <a:t>    width, height </a:t>
+            </a:r>
+            <a:r>
+              <a:rPr lang="en-US" sz="2400" dirty="0" err="1">
+                <a:highlight>
+                  <a:srgbClr val="FFFF00"/>
+                </a:highlight>
+                <a:latin typeface="American Typewriter" panose="02090604020004020304" pitchFamily="18" charset="77"/>
+              </a:rPr>
+              <a:t>int</a:t>
+            </a:r>
+            <a:endParaRPr lang="en-US" sz="2400" dirty="0">
+              <a:highlight>
+                <a:srgbClr val="FFFF00"/>
+              </a:highlight>
+              <a:latin typeface="American Typewriter" panose="02090604020004020304" pitchFamily="18" charset="77"/>
+            </a:endParaRPr>
+          </a:p>
+          <a:p>
+            <a:pPr marL="177800" indent="0">
+              <a:buNone/>
+            </a:pPr>
+            <a:r>
+              <a:rPr lang="en-US" sz="2400" dirty="0">
+                <a:highlight>
+                  <a:srgbClr val="FFFF00"/>
+                </a:highlight>
+                <a:latin typeface="American Typewriter" panose="02090604020004020304" pitchFamily="18" charset="77"/>
+              </a:rPr>
+              <a:t>}</a:t>
+            </a:r>
+          </a:p>
+          <a:p>
+            <a:pPr marL="177800" indent="0">
+              <a:buNone/>
+            </a:pPr>
+            <a:r>
+              <a:rPr lang="en-US" sz="2400" dirty="0"/>
+              <a:t>Now we want to be able to get the area of that rectangle:</a:t>
+            </a:r>
+          </a:p>
+          <a:p>
+            <a:pPr marL="177800" indent="0">
+              <a:buNone/>
+            </a:pPr>
+            <a:r>
+              <a:rPr lang="en-US" sz="2400" dirty="0" err="1">
+                <a:highlight>
+                  <a:srgbClr val="FFFF00"/>
+                </a:highlight>
+                <a:latin typeface="American Typewriter" panose="02090604020004020304" pitchFamily="18" charset="77"/>
+              </a:rPr>
+              <a:t>func</a:t>
+            </a:r>
+            <a:r>
+              <a:rPr lang="en-US" sz="2400" dirty="0">
+                <a:highlight>
+                  <a:srgbClr val="FFFF00"/>
+                </a:highlight>
+                <a:latin typeface="American Typewriter" panose="02090604020004020304" pitchFamily="18" charset="77"/>
+              </a:rPr>
+              <a:t> (r </a:t>
+            </a:r>
+            <a:r>
+              <a:rPr lang="en-US" sz="2400" dirty="0" err="1">
+                <a:highlight>
+                  <a:srgbClr val="FFFF00"/>
+                </a:highlight>
+                <a:latin typeface="American Typewriter" panose="02090604020004020304" pitchFamily="18" charset="77"/>
+              </a:rPr>
+              <a:t>rect</a:t>
+            </a:r>
+            <a:r>
+              <a:rPr lang="en-US" sz="2400" dirty="0">
+                <a:highlight>
+                  <a:srgbClr val="FFFF00"/>
+                </a:highlight>
+                <a:latin typeface="American Typewriter" panose="02090604020004020304" pitchFamily="18" charset="77"/>
+              </a:rPr>
+              <a:t>) </a:t>
+            </a:r>
+            <a:r>
+              <a:rPr lang="en-US" sz="2400" dirty="0" err="1">
+                <a:highlight>
+                  <a:srgbClr val="FFFF00"/>
+                </a:highlight>
+                <a:latin typeface="American Typewriter" panose="02090604020004020304" pitchFamily="18" charset="77"/>
+              </a:rPr>
+              <a:t>perim</a:t>
+            </a:r>
+            <a:r>
+              <a:rPr lang="en-US" sz="2400" dirty="0">
+                <a:highlight>
+                  <a:srgbClr val="FFFF00"/>
+                </a:highlight>
+                <a:latin typeface="American Typewriter" panose="02090604020004020304" pitchFamily="18" charset="77"/>
+              </a:rPr>
+              <a:t>() </a:t>
+            </a:r>
+            <a:r>
+              <a:rPr lang="en-US" sz="2400" dirty="0" err="1">
+                <a:highlight>
+                  <a:srgbClr val="FFFF00"/>
+                </a:highlight>
+                <a:latin typeface="American Typewriter" panose="02090604020004020304" pitchFamily="18" charset="77"/>
+              </a:rPr>
+              <a:t>int</a:t>
+            </a:r>
+            <a:r>
+              <a:rPr lang="en-US" sz="2400" dirty="0">
+                <a:highlight>
+                  <a:srgbClr val="FFFF00"/>
+                </a:highlight>
+                <a:latin typeface="American Typewriter" panose="02090604020004020304" pitchFamily="18" charset="77"/>
+              </a:rPr>
+              <a:t> {</a:t>
+            </a:r>
+          </a:p>
+          <a:p>
+            <a:pPr marL="177800" indent="0">
+              <a:buNone/>
+            </a:pPr>
+            <a:r>
+              <a:rPr lang="en-US" sz="2400" dirty="0">
+                <a:highlight>
+                  <a:srgbClr val="FFFF00"/>
+                </a:highlight>
+                <a:latin typeface="American Typewriter" panose="02090604020004020304" pitchFamily="18" charset="77"/>
+              </a:rPr>
+              <a:t>    return 2*</a:t>
+            </a:r>
+            <a:r>
+              <a:rPr lang="en-US" sz="2400" dirty="0" err="1">
+                <a:highlight>
+                  <a:srgbClr val="FFFF00"/>
+                </a:highlight>
+                <a:latin typeface="American Typewriter" panose="02090604020004020304" pitchFamily="18" charset="77"/>
+              </a:rPr>
+              <a:t>r.width</a:t>
+            </a:r>
+            <a:r>
+              <a:rPr lang="en-US" sz="2400" dirty="0">
+                <a:highlight>
+                  <a:srgbClr val="FFFF00"/>
+                </a:highlight>
+                <a:latin typeface="American Typewriter" panose="02090604020004020304" pitchFamily="18" charset="77"/>
+              </a:rPr>
+              <a:t> + 2*</a:t>
+            </a:r>
+            <a:r>
+              <a:rPr lang="en-US" sz="2400" dirty="0" err="1">
+                <a:highlight>
+                  <a:srgbClr val="FFFF00"/>
+                </a:highlight>
+                <a:latin typeface="American Typewriter" panose="02090604020004020304" pitchFamily="18" charset="77"/>
+              </a:rPr>
+              <a:t>r.height</a:t>
+            </a:r>
+            <a:endParaRPr lang="en-US" sz="2400" dirty="0">
+              <a:highlight>
+                <a:srgbClr val="FFFF00"/>
+              </a:highlight>
+              <a:latin typeface="American Typewriter" panose="02090604020004020304" pitchFamily="18" charset="77"/>
+            </a:endParaRPr>
+          </a:p>
+          <a:p>
+            <a:pPr marL="177800" indent="0">
+              <a:buNone/>
+            </a:pPr>
+            <a:r>
+              <a:rPr lang="en-US" sz="2400" dirty="0">
+                <a:highlight>
+                  <a:srgbClr val="FFFF00"/>
+                </a:highlight>
+                <a:latin typeface="American Typewriter" panose="02090604020004020304" pitchFamily="18" charset="77"/>
+              </a:rPr>
+              <a:t>}</a:t>
+            </a:r>
+          </a:p>
+          <a:p>
+            <a:pPr marL="177800" indent="0">
+              <a:buNone/>
+            </a:pPr>
+            <a:endParaRPr lang="en-US" dirty="0">
+              <a:highlight>
+                <a:srgbClr val="FFFF00"/>
+              </a:highlight>
+            </a:endParaRPr>
+          </a:p>
+        </p:txBody>
+      </p:sp>
+      <p:pic>
+        <p:nvPicPr>
+          <p:cNvPr id="8194" name="Picture 2" descr="Image result for golang gopher">
+            <a:extLst>
+              <a:ext uri="{FF2B5EF4-FFF2-40B4-BE49-F238E27FC236}">
+                <a16:creationId xmlns:a16="http://schemas.microsoft.com/office/drawing/2014/main" id="{11BB026F-0C31-6D43-96A8-8E903F5CDA82}"/>
+              </a:ext>
+            </a:extLst>
+          </p:cNvPr>
+          <p:cNvPicPr>
+            <a:picLocks noChangeAspect="1" noChangeArrowheads="1"/>
+          </p:cNvPicPr>
+          <p:nvPr/>
+        </p:nvPicPr>
+        <p:blipFill>
+          <a:blip r:embed="rId2">
+            <a:extLst>
+              <a:ext uri="{28A0092B-C50C-407E-A947-70E740481C1C}">
+                <a14:useLocalDpi xmlns:a14="http://schemas.microsoft.com/office/drawing/2010/main" val="0"/>
+              </a:ext>
+            </a:extLst>
+          </a:blip>
+          <a:srcRect/>
+          <a:stretch>
+            <a:fillRect/>
+          </a:stretch>
+        </p:blipFill>
+        <p:spPr bwMode="auto">
+          <a:xfrm>
+            <a:off x="5154259" y="5024486"/>
+            <a:ext cx="3401677" cy="1581935"/>
+          </a:xfrm>
+          <a:prstGeom prst="rect">
+            <a:avLst/>
+          </a:prstGeom>
+          <a:noFill/>
+          <a:extLst>
+            <a:ext uri="{909E8E84-426E-40DD-AFC4-6F175D3DCCD1}">
+              <a14:hiddenFill xmlns:a14="http://schemas.microsoft.com/office/drawing/2010/main">
+                <a:solidFill>
+                  <a:srgbClr val="FFFFFF"/>
+                </a:solidFill>
+              </a14:hiddenFill>
+            </a:ext>
+          </a:extLst>
+        </p:spPr>
+      </p:pic>
+    </p:spTree>
+    <p:extLst>
+      <p:ext uri="{BB962C8B-B14F-4D97-AF65-F5344CB8AC3E}">
+        <p14:creationId xmlns:p14="http://schemas.microsoft.com/office/powerpoint/2010/main" val="1252470443"/>
+      </p:ext>
+    </p:extLst>
+  </p:cSld>
+  <p:clrMapOvr>
+    <a:masterClrMapping/>
+  </p:clrMapOvr>
+</p:sld>
+</file>
+
+<file path=ppt/slides/slide49.xml><?xml version="1.0" encoding="utf-8"?>
+<p:sld xmlns:a="http://schemas.openxmlformats.org/drawingml/2006/main" xmlns:r="http://schemas.openxmlformats.org/officeDocument/2006/relationships" xmlns:p="http://schemas.openxmlformats.org/presentationml/2006/main">
+  <p:cSld>
+    <p:spTree>
+      <p:nvGrpSpPr>
+        <p:cNvPr id="1" name=""/>
+        <p:cNvGrpSpPr/>
+        <p:nvPr/>
+      </p:nvGrpSpPr>
+      <p:grpSpPr>
+        <a:xfrm>
+          <a:off x="0" y="0"/>
+          <a:ext cx="0" cy="0"/>
+          <a:chOff x="0" y="0"/>
+          <a:chExt cx="0" cy="0"/>
+        </a:xfrm>
+      </p:grpSpPr>
+      <p:sp>
+        <p:nvSpPr>
+          <p:cNvPr id="2" name="Title 1">
+            <a:extLst>
+              <a:ext uri="{FF2B5EF4-FFF2-40B4-BE49-F238E27FC236}">
+                <a16:creationId xmlns:a16="http://schemas.microsoft.com/office/drawing/2014/main" id="{3D4DAEB5-C77A-3047-AE1A-EC458E3AF5EE}"/>
+              </a:ext>
+            </a:extLst>
+          </p:cNvPr>
+          <p:cNvSpPr>
+            <a:spLocks noGrp="1"/>
+          </p:cNvSpPr>
+          <p:nvPr>
+            <p:ph type="title"/>
+          </p:nvPr>
+        </p:nvSpPr>
+        <p:spPr/>
+        <p:txBody>
+          <a:bodyPr/>
+          <a:lstStyle/>
+          <a:p>
+            <a:r>
+              <a:rPr lang="en-US" dirty="0"/>
+              <a:t>Consider this function:</a:t>
+            </a:r>
+          </a:p>
+        </p:txBody>
+      </p:sp>
+      <p:sp>
+        <p:nvSpPr>
+          <p:cNvPr id="3" name="Text Placeholder 2">
+            <a:extLst>
+              <a:ext uri="{FF2B5EF4-FFF2-40B4-BE49-F238E27FC236}">
+                <a16:creationId xmlns:a16="http://schemas.microsoft.com/office/drawing/2014/main" id="{434028F2-ECED-6F45-82FA-8F43A9533682}"/>
+              </a:ext>
+            </a:extLst>
+          </p:cNvPr>
+          <p:cNvSpPr>
+            <a:spLocks noGrp="1"/>
+          </p:cNvSpPr>
+          <p:nvPr>
+            <p:ph type="body" idx="1"/>
+          </p:nvPr>
+        </p:nvSpPr>
+        <p:spPr/>
+        <p:txBody>
+          <a:bodyPr/>
+          <a:lstStyle/>
+          <a:p>
+            <a:pPr marL="177800" indent="0">
+              <a:buNone/>
+            </a:pPr>
+            <a:r>
+              <a:rPr lang="en-US" dirty="0" err="1">
+                <a:highlight>
+                  <a:srgbClr val="FFFF00"/>
+                </a:highlight>
+                <a:latin typeface="American Typewriter" panose="02090604020004020304" pitchFamily="18" charset="77"/>
+              </a:rPr>
+              <a:t>func</a:t>
+            </a:r>
+            <a:r>
+              <a:rPr lang="en-US" dirty="0">
+                <a:highlight>
+                  <a:srgbClr val="FFFF00"/>
+                </a:highlight>
+                <a:latin typeface="American Typewriter" panose="02090604020004020304" pitchFamily="18" charset="77"/>
+              </a:rPr>
+              <a:t> (r </a:t>
+            </a:r>
+            <a:r>
+              <a:rPr lang="en-US" dirty="0" err="1">
+                <a:highlight>
+                  <a:srgbClr val="FFFF00"/>
+                </a:highlight>
+                <a:latin typeface="American Typewriter" panose="02090604020004020304" pitchFamily="18" charset="77"/>
+              </a:rPr>
+              <a:t>rect</a:t>
+            </a:r>
+            <a:r>
+              <a:rPr lang="en-US" dirty="0">
+                <a:highlight>
+                  <a:srgbClr val="FFFF00"/>
+                </a:highlight>
+                <a:latin typeface="American Typewriter" panose="02090604020004020304" pitchFamily="18" charset="77"/>
+              </a:rPr>
+              <a:t>) </a:t>
+            </a:r>
+            <a:r>
+              <a:rPr lang="en-US" dirty="0" err="1">
+                <a:highlight>
+                  <a:srgbClr val="FFFF00"/>
+                </a:highlight>
+                <a:latin typeface="American Typewriter" panose="02090604020004020304" pitchFamily="18" charset="77"/>
+              </a:rPr>
+              <a:t>perim</a:t>
+            </a:r>
+            <a:r>
+              <a:rPr lang="en-US" dirty="0">
+                <a:highlight>
+                  <a:srgbClr val="FFFF00"/>
+                </a:highlight>
+                <a:latin typeface="American Typewriter" panose="02090604020004020304" pitchFamily="18" charset="77"/>
+              </a:rPr>
+              <a:t>() </a:t>
+            </a:r>
+            <a:r>
+              <a:rPr lang="en-US" dirty="0" err="1">
+                <a:highlight>
+                  <a:srgbClr val="FFFF00"/>
+                </a:highlight>
+                <a:latin typeface="American Typewriter" panose="02090604020004020304" pitchFamily="18" charset="77"/>
+              </a:rPr>
+              <a:t>int</a:t>
+            </a:r>
+            <a:r>
+              <a:rPr lang="en-US" dirty="0">
+                <a:highlight>
+                  <a:srgbClr val="FFFF00"/>
+                </a:highlight>
+                <a:latin typeface="American Typewriter" panose="02090604020004020304" pitchFamily="18" charset="77"/>
+              </a:rPr>
+              <a:t> {</a:t>
+            </a:r>
+          </a:p>
+          <a:p>
+            <a:pPr marL="177800" indent="0">
+              <a:buNone/>
+            </a:pPr>
+            <a:r>
+              <a:rPr lang="en-US" dirty="0">
+                <a:highlight>
+                  <a:srgbClr val="FFFF00"/>
+                </a:highlight>
+                <a:latin typeface="American Typewriter" panose="02090604020004020304" pitchFamily="18" charset="77"/>
+              </a:rPr>
+              <a:t>    return 2*</a:t>
+            </a:r>
+            <a:r>
+              <a:rPr lang="en-US" dirty="0" err="1">
+                <a:highlight>
+                  <a:srgbClr val="FFFF00"/>
+                </a:highlight>
+                <a:latin typeface="American Typewriter" panose="02090604020004020304" pitchFamily="18" charset="77"/>
+              </a:rPr>
+              <a:t>r.width</a:t>
+            </a:r>
+            <a:r>
+              <a:rPr lang="en-US" dirty="0">
+                <a:highlight>
+                  <a:srgbClr val="FFFF00"/>
+                </a:highlight>
+                <a:latin typeface="American Typewriter" panose="02090604020004020304" pitchFamily="18" charset="77"/>
+              </a:rPr>
+              <a:t> + 2*</a:t>
+            </a:r>
+            <a:r>
+              <a:rPr lang="en-US" dirty="0" err="1">
+                <a:highlight>
+                  <a:srgbClr val="FFFF00"/>
+                </a:highlight>
+                <a:latin typeface="American Typewriter" panose="02090604020004020304" pitchFamily="18" charset="77"/>
+              </a:rPr>
+              <a:t>r.height</a:t>
+            </a:r>
+            <a:endParaRPr lang="en-US" dirty="0">
+              <a:highlight>
+                <a:srgbClr val="FFFF00"/>
+              </a:highlight>
+              <a:latin typeface="American Typewriter" panose="02090604020004020304" pitchFamily="18" charset="77"/>
+            </a:endParaRPr>
+          </a:p>
+          <a:p>
+            <a:pPr marL="177800" indent="0">
+              <a:buNone/>
+            </a:pPr>
+            <a:r>
+              <a:rPr lang="en-US" dirty="0">
+                <a:highlight>
+                  <a:srgbClr val="FFFF00"/>
+                </a:highlight>
+                <a:latin typeface="American Typewriter" panose="02090604020004020304" pitchFamily="18" charset="77"/>
+              </a:rPr>
+              <a:t>}</a:t>
+            </a:r>
+          </a:p>
+          <a:p>
+            <a:pPr marL="177800" indent="0">
+              <a:buNone/>
+            </a:pPr>
+            <a:endParaRPr lang="en-US" dirty="0"/>
+          </a:p>
+          <a:p>
+            <a:pPr marL="177800" indent="0">
+              <a:buNone/>
+            </a:pPr>
+            <a:r>
+              <a:rPr lang="en-US" dirty="0"/>
+              <a:t>Then to call it:</a:t>
+            </a:r>
+          </a:p>
+          <a:p>
+            <a:pPr marL="177800" indent="0">
+              <a:buNone/>
+            </a:pPr>
+            <a:endParaRPr lang="en-US" dirty="0">
+              <a:highlight>
+                <a:srgbClr val="FFFF00"/>
+              </a:highlight>
+            </a:endParaRPr>
+          </a:p>
+          <a:p>
+            <a:pPr marL="177800" indent="0">
+              <a:buNone/>
+            </a:pPr>
+            <a:r>
+              <a:rPr lang="en-US" dirty="0">
+                <a:highlight>
+                  <a:srgbClr val="FFFF00"/>
+                </a:highlight>
+                <a:latin typeface="American Typewriter" panose="02090604020004020304" pitchFamily="18" charset="77"/>
+              </a:rPr>
+              <a:t>//first define:</a:t>
+            </a:r>
+          </a:p>
+          <a:p>
+            <a:pPr marL="177800" indent="0">
+              <a:buNone/>
+            </a:pPr>
+            <a:r>
+              <a:rPr lang="en-US" dirty="0">
+                <a:highlight>
+                  <a:srgbClr val="FFFF00"/>
+                </a:highlight>
+                <a:latin typeface="American Typewriter" panose="02090604020004020304" pitchFamily="18" charset="77"/>
+              </a:rPr>
+              <a:t>r := </a:t>
+            </a:r>
+            <a:r>
+              <a:rPr lang="en-US" dirty="0" err="1">
+                <a:highlight>
+                  <a:srgbClr val="FFFF00"/>
+                </a:highlight>
+                <a:latin typeface="American Typewriter" panose="02090604020004020304" pitchFamily="18" charset="77"/>
+              </a:rPr>
+              <a:t>rect</a:t>
+            </a:r>
+            <a:r>
+              <a:rPr lang="en-US" dirty="0">
+                <a:highlight>
+                  <a:srgbClr val="FFFF00"/>
+                </a:highlight>
+                <a:latin typeface="American Typewriter" panose="02090604020004020304" pitchFamily="18" charset="77"/>
+              </a:rPr>
+              <a:t>{width: 10, height: 5}</a:t>
+            </a:r>
+          </a:p>
+          <a:p>
+            <a:pPr marL="177800" indent="0">
+              <a:buNone/>
+            </a:pPr>
+            <a:r>
+              <a:rPr lang="en-US" dirty="0">
+                <a:highlight>
+                  <a:srgbClr val="FFFF00"/>
+                </a:highlight>
+                <a:latin typeface="American Typewriter" panose="02090604020004020304" pitchFamily="18" charset="77"/>
+              </a:rPr>
+              <a:t>//then call</a:t>
+            </a:r>
+          </a:p>
+          <a:p>
+            <a:pPr marL="177800" indent="0">
+              <a:buNone/>
+            </a:pPr>
+            <a:r>
+              <a:rPr lang="en-US" dirty="0" err="1">
+                <a:highlight>
+                  <a:srgbClr val="FFFF00"/>
+                </a:highlight>
+                <a:latin typeface="American Typewriter" panose="02090604020004020304" pitchFamily="18" charset="77"/>
+              </a:rPr>
+              <a:t>fmt.Println</a:t>
+            </a:r>
+            <a:r>
+              <a:rPr lang="en-US" dirty="0">
+                <a:highlight>
+                  <a:srgbClr val="FFFF00"/>
+                </a:highlight>
+                <a:latin typeface="American Typewriter" panose="02090604020004020304" pitchFamily="18" charset="77"/>
+              </a:rPr>
+              <a:t>(</a:t>
+            </a:r>
+            <a:r>
+              <a:rPr lang="en-US" dirty="0" err="1">
+                <a:highlight>
+                  <a:srgbClr val="FFFF00"/>
+                </a:highlight>
+                <a:latin typeface="American Typewriter" panose="02090604020004020304" pitchFamily="18" charset="77"/>
+              </a:rPr>
+              <a:t>r.perim</a:t>
+            </a:r>
+            <a:r>
+              <a:rPr lang="en-US" dirty="0">
+                <a:highlight>
+                  <a:srgbClr val="FFFF00"/>
+                </a:highlight>
+                <a:latin typeface="American Typewriter" panose="02090604020004020304" pitchFamily="18" charset="77"/>
+              </a:rPr>
+              <a:t>())</a:t>
+            </a:r>
+          </a:p>
+        </p:txBody>
+      </p:sp>
+      <p:pic>
+        <p:nvPicPr>
+          <p:cNvPr id="9220" name="Picture 4" descr="Image result for golang gopher">
+            <a:extLst>
+              <a:ext uri="{FF2B5EF4-FFF2-40B4-BE49-F238E27FC236}">
+                <a16:creationId xmlns:a16="http://schemas.microsoft.com/office/drawing/2014/main" id="{C2A27611-662D-B542-87D7-A6A970862128}"/>
+              </a:ext>
+            </a:extLst>
+          </p:cNvPr>
+          <p:cNvPicPr>
+            <a:picLocks noChangeAspect="1" noChangeArrowheads="1"/>
+          </p:cNvPicPr>
+          <p:nvPr/>
+        </p:nvPicPr>
+        <p:blipFill>
+          <a:blip r:embed="rId2">
+            <a:extLst>
+              <a:ext uri="{28A0092B-C50C-407E-A947-70E740481C1C}">
+                <a14:useLocalDpi xmlns:a14="http://schemas.microsoft.com/office/drawing/2010/main" val="0"/>
+              </a:ext>
+            </a:extLst>
+          </a:blip>
+          <a:srcRect/>
+          <a:stretch>
+            <a:fillRect/>
+          </a:stretch>
+        </p:blipFill>
+        <p:spPr bwMode="auto">
+          <a:xfrm>
+            <a:off x="5462243" y="2559738"/>
+            <a:ext cx="2857500" cy="2857500"/>
+          </a:xfrm>
+          <a:prstGeom prst="rect">
+            <a:avLst/>
+          </a:prstGeom>
+          <a:noFill/>
+          <a:extLst>
+            <a:ext uri="{909E8E84-426E-40DD-AFC4-6F175D3DCCD1}">
+              <a14:hiddenFill xmlns:a14="http://schemas.microsoft.com/office/drawing/2010/main">
+                <a:solidFill>
+                  <a:srgbClr val="FFFFFF"/>
+                </a:solidFill>
+              </a14:hiddenFill>
+            </a:ext>
+          </a:extLst>
+        </p:spPr>
+      </p:pic>
+    </p:spTree>
+    <p:extLst>
+      <p:ext uri="{BB962C8B-B14F-4D97-AF65-F5344CB8AC3E}">
+        <p14:creationId xmlns:p14="http://schemas.microsoft.com/office/powerpoint/2010/main" val="4153244075"/>
       </p:ext>
     </p:extLst>
   </p:cSld>
@@ -18563,6 +20379,1481 @@
     <p:extLst>
       <p:ext uri="{BB962C8B-B14F-4D97-AF65-F5344CB8AC3E}">
         <p14:creationId xmlns:p14="http://schemas.microsoft.com/office/powerpoint/2010/main" val="1513115951"/>
+      </p:ext>
+    </p:extLst>
+  </p:cSld>
+  <p:clrMapOvr>
+    <a:masterClrMapping/>
+  </p:clrMapOvr>
+</p:sld>
+</file>
+
+<file path=ppt/slides/slide50.xml><?xml version="1.0" encoding="utf-8"?>
+<p:sld xmlns:a="http://schemas.openxmlformats.org/drawingml/2006/main" xmlns:r="http://schemas.openxmlformats.org/officeDocument/2006/relationships" xmlns:p="http://schemas.openxmlformats.org/presentationml/2006/main">
+  <p:cSld>
+    <p:spTree>
+      <p:nvGrpSpPr>
+        <p:cNvPr id="1" name=""/>
+        <p:cNvGrpSpPr/>
+        <p:nvPr/>
+      </p:nvGrpSpPr>
+      <p:grpSpPr>
+        <a:xfrm>
+          <a:off x="0" y="0"/>
+          <a:ext cx="0" cy="0"/>
+          <a:chOff x="0" y="0"/>
+          <a:chExt cx="0" cy="0"/>
+        </a:xfrm>
+      </p:grpSpPr>
+      <p:sp>
+        <p:nvSpPr>
+          <p:cNvPr id="2" name="Title 1">
+            <a:extLst>
+              <a:ext uri="{FF2B5EF4-FFF2-40B4-BE49-F238E27FC236}">
+                <a16:creationId xmlns:a16="http://schemas.microsoft.com/office/drawing/2014/main" id="{DF383B22-1FBF-1545-9CB1-7A87EEC6DF68}"/>
+              </a:ext>
+            </a:extLst>
+          </p:cNvPr>
+          <p:cNvSpPr>
+            <a:spLocks noGrp="1"/>
+          </p:cNvSpPr>
+          <p:nvPr>
+            <p:ph type="title"/>
+          </p:nvPr>
+        </p:nvSpPr>
+        <p:spPr/>
+        <p:txBody>
+          <a:bodyPr/>
+          <a:lstStyle/>
+          <a:p>
+            <a:r>
+              <a:rPr lang="en-US" dirty="0"/>
+              <a:t>Structs and functions</a:t>
+            </a:r>
+          </a:p>
+        </p:txBody>
+      </p:sp>
+      <p:sp>
+        <p:nvSpPr>
+          <p:cNvPr id="3" name="Text Placeholder 2">
+            <a:extLst>
+              <a:ext uri="{FF2B5EF4-FFF2-40B4-BE49-F238E27FC236}">
+                <a16:creationId xmlns:a16="http://schemas.microsoft.com/office/drawing/2014/main" id="{6726EF7F-6539-C844-A3A1-167916391BB1}"/>
+              </a:ext>
+            </a:extLst>
+          </p:cNvPr>
+          <p:cNvSpPr>
+            <a:spLocks noGrp="1"/>
+          </p:cNvSpPr>
+          <p:nvPr>
+            <p:ph type="body" idx="1"/>
+          </p:nvPr>
+        </p:nvSpPr>
+        <p:spPr/>
+        <p:txBody>
+          <a:bodyPr/>
+          <a:lstStyle/>
+          <a:p>
+            <a:r>
+              <a:rPr lang="en-US" dirty="0"/>
+              <a:t>So as you can see- we altered the function method and we are pointing back at our struct as the </a:t>
+            </a:r>
+            <a:r>
+              <a:rPr lang="en-US" b="1" dirty="0"/>
+              <a:t>receiver</a:t>
+            </a:r>
+            <a:r>
+              <a:rPr lang="en-US" dirty="0"/>
+              <a:t> of the output of the function. </a:t>
+            </a:r>
+          </a:p>
+          <a:p>
+            <a:r>
+              <a:rPr lang="en-US" dirty="0"/>
+              <a:t>You then call the function the same way you would normally (in most languages) call a function within the object- with </a:t>
+            </a:r>
+            <a:r>
+              <a:rPr lang="en-US" b="1" dirty="0" err="1"/>
+              <a:t>structName.functionName</a:t>
+            </a:r>
+            <a:r>
+              <a:rPr lang="en-US" b="1" dirty="0"/>
+              <a:t>()</a:t>
+            </a:r>
+            <a:endParaRPr lang="en-US" dirty="0"/>
+          </a:p>
+        </p:txBody>
+      </p:sp>
+      <p:pic>
+        <p:nvPicPr>
+          <p:cNvPr id="10242" name="Picture 2" descr="Image result for golang gopher">
+            <a:extLst>
+              <a:ext uri="{FF2B5EF4-FFF2-40B4-BE49-F238E27FC236}">
+                <a16:creationId xmlns:a16="http://schemas.microsoft.com/office/drawing/2014/main" id="{C26AFA25-03D2-7644-9D07-F355C0EE7B79}"/>
+              </a:ext>
+            </a:extLst>
+          </p:cNvPr>
+          <p:cNvPicPr>
+            <a:picLocks noChangeAspect="1" noChangeArrowheads="1"/>
+          </p:cNvPicPr>
+          <p:nvPr/>
+        </p:nvPicPr>
+        <p:blipFill>
+          <a:blip r:embed="rId2">
+            <a:extLst>
+              <a:ext uri="{28A0092B-C50C-407E-A947-70E740481C1C}">
+                <a14:useLocalDpi xmlns:a14="http://schemas.microsoft.com/office/drawing/2010/main" val="0"/>
+              </a:ext>
+            </a:extLst>
+          </a:blip>
+          <a:srcRect/>
+          <a:stretch>
+            <a:fillRect/>
+          </a:stretch>
+        </p:blipFill>
+        <p:spPr bwMode="auto">
+          <a:xfrm>
+            <a:off x="2560229" y="4267199"/>
+            <a:ext cx="3797300" cy="2133600"/>
+          </a:xfrm>
+          <a:prstGeom prst="rect">
+            <a:avLst/>
+          </a:prstGeom>
+          <a:noFill/>
+          <a:extLst>
+            <a:ext uri="{909E8E84-426E-40DD-AFC4-6F175D3DCCD1}">
+              <a14:hiddenFill xmlns:a14="http://schemas.microsoft.com/office/drawing/2010/main">
+                <a:solidFill>
+                  <a:srgbClr val="FFFFFF"/>
+                </a:solidFill>
+              </a14:hiddenFill>
+            </a:ext>
+          </a:extLst>
+        </p:spPr>
+      </p:pic>
+    </p:spTree>
+    <p:extLst>
+      <p:ext uri="{BB962C8B-B14F-4D97-AF65-F5344CB8AC3E}">
+        <p14:creationId xmlns:p14="http://schemas.microsoft.com/office/powerpoint/2010/main" val="3190768411"/>
+      </p:ext>
+    </p:extLst>
+  </p:cSld>
+  <p:clrMapOvr>
+    <a:masterClrMapping/>
+  </p:clrMapOvr>
+</p:sld>
+</file>
+
+<file path=ppt/slides/slide51.xml><?xml version="1.0" encoding="utf-8"?>
+<p:sld xmlns:a="http://schemas.openxmlformats.org/drawingml/2006/main" xmlns:r="http://schemas.openxmlformats.org/officeDocument/2006/relationships" xmlns:p="http://schemas.openxmlformats.org/presentationml/2006/main">
+  <p:cSld>
+    <p:spTree>
+      <p:nvGrpSpPr>
+        <p:cNvPr id="1" name=""/>
+        <p:cNvGrpSpPr/>
+        <p:nvPr/>
+      </p:nvGrpSpPr>
+      <p:grpSpPr>
+        <a:xfrm>
+          <a:off x="0" y="0"/>
+          <a:ext cx="0" cy="0"/>
+          <a:chOff x="0" y="0"/>
+          <a:chExt cx="0" cy="0"/>
+        </a:xfrm>
+      </p:grpSpPr>
+      <p:sp>
+        <p:nvSpPr>
+          <p:cNvPr id="2" name="Title 1">
+            <a:extLst>
+              <a:ext uri="{FF2B5EF4-FFF2-40B4-BE49-F238E27FC236}">
+                <a16:creationId xmlns:a16="http://schemas.microsoft.com/office/drawing/2014/main" id="{2F6A0346-CF4A-B843-883D-FFB45B50FD75}"/>
+              </a:ext>
+            </a:extLst>
+          </p:cNvPr>
+          <p:cNvSpPr>
+            <a:spLocks noGrp="1"/>
+          </p:cNvSpPr>
+          <p:nvPr>
+            <p:ph type="title"/>
+          </p:nvPr>
+        </p:nvSpPr>
+        <p:spPr/>
+        <p:txBody>
+          <a:bodyPr/>
+          <a:lstStyle/>
+          <a:p>
+            <a:r>
+              <a:rPr lang="en-US" dirty="0"/>
+              <a:t>Interfaces In GO</a:t>
+            </a:r>
+          </a:p>
+        </p:txBody>
+      </p:sp>
+      <p:sp>
+        <p:nvSpPr>
+          <p:cNvPr id="3" name="Text Placeholder 2">
+            <a:extLst>
+              <a:ext uri="{FF2B5EF4-FFF2-40B4-BE49-F238E27FC236}">
+                <a16:creationId xmlns:a16="http://schemas.microsoft.com/office/drawing/2014/main" id="{C9F8264F-2C28-574A-9294-8BCE2E5484EE}"/>
+              </a:ext>
+            </a:extLst>
+          </p:cNvPr>
+          <p:cNvSpPr>
+            <a:spLocks noGrp="1"/>
+          </p:cNvSpPr>
+          <p:nvPr>
+            <p:ph type="body" idx="1"/>
+          </p:nvPr>
+        </p:nvSpPr>
+        <p:spPr/>
+        <p:txBody>
+          <a:bodyPr/>
+          <a:lstStyle/>
+          <a:p>
+            <a:r>
+              <a:rPr lang="en-US" dirty="0"/>
+              <a:t> In coding the term “interface” comes with a lot of baggage. For GO you can think of it a lot like how we use it in </a:t>
+            </a:r>
+            <a:r>
+              <a:rPr lang="en-US" b="1" dirty="0"/>
+              <a:t>Java</a:t>
+            </a:r>
+            <a:r>
+              <a:rPr lang="en-US" dirty="0"/>
+              <a:t>. </a:t>
+            </a:r>
+          </a:p>
+          <a:p>
+            <a:r>
+              <a:rPr lang="en-US" dirty="0"/>
+              <a:t>An interface is primarily used to achieve </a:t>
+            </a:r>
+            <a:r>
+              <a:rPr lang="en-US" i="1" dirty="0"/>
+              <a:t>polymorphism</a:t>
+            </a:r>
+            <a:r>
+              <a:rPr lang="en-US" dirty="0"/>
+              <a:t> by creating a collection of </a:t>
+            </a:r>
+            <a:r>
+              <a:rPr lang="en-US" i="1" dirty="0"/>
+              <a:t>methods </a:t>
+            </a:r>
+            <a:r>
+              <a:rPr lang="en-US" dirty="0"/>
+              <a:t>that can act on any struct.</a:t>
+            </a:r>
+          </a:p>
+          <a:p>
+            <a:r>
+              <a:rPr lang="en-US" dirty="0"/>
+              <a:t>We are encapsulating </a:t>
+            </a:r>
+            <a:r>
+              <a:rPr lang="en-US" b="1" dirty="0"/>
+              <a:t>behavior</a:t>
+            </a:r>
+            <a:r>
+              <a:rPr lang="en-US" dirty="0"/>
+              <a:t> and not an object.</a:t>
+            </a:r>
+          </a:p>
+        </p:txBody>
+      </p:sp>
+      <p:pic>
+        <p:nvPicPr>
+          <p:cNvPr id="11266" name="Picture 2" descr="Image result for golang gopher">
+            <a:extLst>
+              <a:ext uri="{FF2B5EF4-FFF2-40B4-BE49-F238E27FC236}">
+                <a16:creationId xmlns:a16="http://schemas.microsoft.com/office/drawing/2014/main" id="{DE8B74A5-B5E4-9F4A-9FD3-3A8924BD3530}"/>
+              </a:ext>
+            </a:extLst>
+          </p:cNvPr>
+          <p:cNvPicPr>
+            <a:picLocks noChangeAspect="1" noChangeArrowheads="1"/>
+          </p:cNvPicPr>
+          <p:nvPr/>
+        </p:nvPicPr>
+        <p:blipFill>
+          <a:blip r:embed="rId2">
+            <a:extLst>
+              <a:ext uri="{28A0092B-C50C-407E-A947-70E740481C1C}">
+                <a14:useLocalDpi xmlns:a14="http://schemas.microsoft.com/office/drawing/2010/main" val="0"/>
+              </a:ext>
+            </a:extLst>
+          </a:blip>
+          <a:srcRect/>
+          <a:stretch>
+            <a:fillRect/>
+          </a:stretch>
+        </p:blipFill>
+        <p:spPr bwMode="auto">
+          <a:xfrm>
+            <a:off x="2345311" y="4615796"/>
+            <a:ext cx="4038600" cy="2019300"/>
+          </a:xfrm>
+          <a:prstGeom prst="rect">
+            <a:avLst/>
+          </a:prstGeom>
+          <a:noFill/>
+          <a:extLst>
+            <a:ext uri="{909E8E84-426E-40DD-AFC4-6F175D3DCCD1}">
+              <a14:hiddenFill xmlns:a14="http://schemas.microsoft.com/office/drawing/2010/main">
+                <a:solidFill>
+                  <a:srgbClr val="FFFFFF"/>
+                </a:solidFill>
+              </a14:hiddenFill>
+            </a:ext>
+          </a:extLst>
+        </p:spPr>
+      </p:pic>
+    </p:spTree>
+    <p:extLst>
+      <p:ext uri="{BB962C8B-B14F-4D97-AF65-F5344CB8AC3E}">
+        <p14:creationId xmlns:p14="http://schemas.microsoft.com/office/powerpoint/2010/main" val="55236471"/>
+      </p:ext>
+    </p:extLst>
+  </p:cSld>
+  <p:clrMapOvr>
+    <a:masterClrMapping/>
+  </p:clrMapOvr>
+</p:sld>
+</file>
+
+<file path=ppt/slides/slide52.xml><?xml version="1.0" encoding="utf-8"?>
+<p:sld xmlns:a="http://schemas.openxmlformats.org/drawingml/2006/main" xmlns:r="http://schemas.openxmlformats.org/officeDocument/2006/relationships" xmlns:p="http://schemas.openxmlformats.org/presentationml/2006/main">
+  <p:cSld>
+    <p:spTree>
+      <p:nvGrpSpPr>
+        <p:cNvPr id="1" name=""/>
+        <p:cNvGrpSpPr/>
+        <p:nvPr/>
+      </p:nvGrpSpPr>
+      <p:grpSpPr>
+        <a:xfrm>
+          <a:off x="0" y="0"/>
+          <a:ext cx="0" cy="0"/>
+          <a:chOff x="0" y="0"/>
+          <a:chExt cx="0" cy="0"/>
+        </a:xfrm>
+      </p:grpSpPr>
+      <p:sp>
+        <p:nvSpPr>
+          <p:cNvPr id="2" name="Title 1">
+            <a:extLst>
+              <a:ext uri="{FF2B5EF4-FFF2-40B4-BE49-F238E27FC236}">
+                <a16:creationId xmlns:a16="http://schemas.microsoft.com/office/drawing/2014/main" id="{606E263E-582B-A840-8461-E68019F03329}"/>
+              </a:ext>
+            </a:extLst>
+          </p:cNvPr>
+          <p:cNvSpPr>
+            <a:spLocks noGrp="1"/>
+          </p:cNvSpPr>
+          <p:nvPr>
+            <p:ph type="title"/>
+          </p:nvPr>
+        </p:nvSpPr>
+        <p:spPr/>
+        <p:txBody>
+          <a:bodyPr/>
+          <a:lstStyle/>
+          <a:p>
+            <a:r>
+              <a:rPr lang="en-US" dirty="0"/>
+              <a:t>How to create Interfaces</a:t>
+            </a:r>
+          </a:p>
+        </p:txBody>
+      </p:sp>
+      <p:sp>
+        <p:nvSpPr>
+          <p:cNvPr id="3" name="Text Placeholder 2">
+            <a:extLst>
+              <a:ext uri="{FF2B5EF4-FFF2-40B4-BE49-F238E27FC236}">
+                <a16:creationId xmlns:a16="http://schemas.microsoft.com/office/drawing/2014/main" id="{2CEDF6C2-F543-5E42-985D-7CF7C108F74C}"/>
+              </a:ext>
+            </a:extLst>
+          </p:cNvPr>
+          <p:cNvSpPr>
+            <a:spLocks noGrp="1"/>
+          </p:cNvSpPr>
+          <p:nvPr>
+            <p:ph type="body" idx="1"/>
+          </p:nvPr>
+        </p:nvSpPr>
+        <p:spPr/>
+        <p:txBody>
+          <a:bodyPr/>
+          <a:lstStyle/>
+          <a:p>
+            <a:r>
+              <a:rPr lang="en-US" dirty="0"/>
+              <a:t> Instantiating interfaces looks a </a:t>
+            </a:r>
+            <a:r>
+              <a:rPr lang="en-US" b="1" dirty="0"/>
+              <a:t>lot</a:t>
+            </a:r>
+            <a:r>
+              <a:rPr lang="en-US" dirty="0"/>
+              <a:t> like structs. </a:t>
+            </a:r>
+          </a:p>
+          <a:p>
+            <a:r>
+              <a:rPr lang="en-US" dirty="0"/>
+              <a:t>They have the function call as the name and the return type as the value:</a:t>
+            </a:r>
+          </a:p>
+          <a:p>
+            <a:pPr marL="177800" indent="0">
+              <a:buNone/>
+            </a:pPr>
+            <a:endParaRPr lang="en-US" dirty="0"/>
+          </a:p>
+          <a:p>
+            <a:pPr marL="177800" indent="0">
+              <a:buNone/>
+            </a:pPr>
+            <a:r>
+              <a:rPr lang="en-US" dirty="0">
+                <a:highlight>
+                  <a:srgbClr val="FFFF00"/>
+                </a:highlight>
+                <a:latin typeface="American Typewriter" panose="02090604020004020304" pitchFamily="18" charset="77"/>
+              </a:rPr>
+              <a:t>type geometry interface {</a:t>
+            </a:r>
+          </a:p>
+          <a:p>
+            <a:pPr marL="177800" indent="0">
+              <a:buNone/>
+            </a:pPr>
+            <a:r>
+              <a:rPr lang="en-US" dirty="0">
+                <a:highlight>
+                  <a:srgbClr val="FFFF00"/>
+                </a:highlight>
+                <a:latin typeface="American Typewriter" panose="02090604020004020304" pitchFamily="18" charset="77"/>
+              </a:rPr>
+              <a:t>    area() float64</a:t>
+            </a:r>
+          </a:p>
+          <a:p>
+            <a:pPr marL="177800" indent="0">
+              <a:buNone/>
+            </a:pPr>
+            <a:r>
+              <a:rPr lang="en-US" dirty="0">
+                <a:highlight>
+                  <a:srgbClr val="FFFF00"/>
+                </a:highlight>
+                <a:latin typeface="American Typewriter" panose="02090604020004020304" pitchFamily="18" charset="77"/>
+              </a:rPr>
+              <a:t>    </a:t>
+            </a:r>
+            <a:r>
+              <a:rPr lang="en-US" dirty="0" err="1">
+                <a:highlight>
+                  <a:srgbClr val="FFFF00"/>
+                </a:highlight>
+                <a:latin typeface="American Typewriter" panose="02090604020004020304" pitchFamily="18" charset="77"/>
+              </a:rPr>
+              <a:t>perim</a:t>
+            </a:r>
+            <a:r>
+              <a:rPr lang="en-US" dirty="0">
+                <a:highlight>
+                  <a:srgbClr val="FFFF00"/>
+                </a:highlight>
+                <a:latin typeface="American Typewriter" panose="02090604020004020304" pitchFamily="18" charset="77"/>
+              </a:rPr>
+              <a:t>() float64</a:t>
+            </a:r>
+          </a:p>
+          <a:p>
+            <a:pPr marL="177800" indent="0">
+              <a:buNone/>
+            </a:pPr>
+            <a:r>
+              <a:rPr lang="en-US" dirty="0">
+                <a:highlight>
+                  <a:srgbClr val="FFFF00"/>
+                </a:highlight>
+                <a:latin typeface="American Typewriter" panose="02090604020004020304" pitchFamily="18" charset="77"/>
+              </a:rPr>
+              <a:t>}</a:t>
+            </a:r>
+          </a:p>
+          <a:p>
+            <a:pPr marL="177800" indent="0">
+              <a:buNone/>
+            </a:pPr>
+            <a:endParaRPr lang="en-US" dirty="0"/>
+          </a:p>
+          <a:p>
+            <a:pPr marL="177800" indent="0">
+              <a:buNone/>
+            </a:pPr>
+            <a:endParaRPr lang="en-US" dirty="0"/>
+          </a:p>
+        </p:txBody>
+      </p:sp>
+      <p:pic>
+        <p:nvPicPr>
+          <p:cNvPr id="12290" name="Picture 2" descr="Image result for golang gopher">
+            <a:extLst>
+              <a:ext uri="{FF2B5EF4-FFF2-40B4-BE49-F238E27FC236}">
+                <a16:creationId xmlns:a16="http://schemas.microsoft.com/office/drawing/2014/main" id="{BF10D233-C6F3-5C40-8508-A82185E832A4}"/>
+              </a:ext>
+            </a:extLst>
+          </p:cNvPr>
+          <p:cNvPicPr>
+            <a:picLocks noChangeAspect="1" noChangeArrowheads="1"/>
+          </p:cNvPicPr>
+          <p:nvPr/>
+        </p:nvPicPr>
+        <p:blipFill>
+          <a:blip r:embed="rId2">
+            <a:extLst>
+              <a:ext uri="{28A0092B-C50C-407E-A947-70E740481C1C}">
+                <a14:useLocalDpi xmlns:a14="http://schemas.microsoft.com/office/drawing/2010/main" val="0"/>
+              </a:ext>
+            </a:extLst>
+          </a:blip>
+          <a:srcRect/>
+          <a:stretch>
+            <a:fillRect/>
+          </a:stretch>
+        </p:blipFill>
+        <p:spPr bwMode="auto">
+          <a:xfrm>
+            <a:off x="5728748" y="2697964"/>
+            <a:ext cx="2362200" cy="3441700"/>
+          </a:xfrm>
+          <a:prstGeom prst="rect">
+            <a:avLst/>
+          </a:prstGeom>
+          <a:noFill/>
+          <a:extLst>
+            <a:ext uri="{909E8E84-426E-40DD-AFC4-6F175D3DCCD1}">
+              <a14:hiddenFill xmlns:a14="http://schemas.microsoft.com/office/drawing/2010/main">
+                <a:solidFill>
+                  <a:srgbClr val="FFFFFF"/>
+                </a:solidFill>
+              </a14:hiddenFill>
+            </a:ext>
+          </a:extLst>
+        </p:spPr>
+      </p:pic>
+    </p:spTree>
+    <p:extLst>
+      <p:ext uri="{BB962C8B-B14F-4D97-AF65-F5344CB8AC3E}">
+        <p14:creationId xmlns:p14="http://schemas.microsoft.com/office/powerpoint/2010/main" val="23251240"/>
+      </p:ext>
+    </p:extLst>
+  </p:cSld>
+  <p:clrMapOvr>
+    <a:masterClrMapping/>
+  </p:clrMapOvr>
+</p:sld>
+</file>
+
+<file path=ppt/slides/slide53.xml><?xml version="1.0" encoding="utf-8"?>
+<p:sld xmlns:a="http://schemas.openxmlformats.org/drawingml/2006/main" xmlns:r="http://schemas.openxmlformats.org/officeDocument/2006/relationships" xmlns:p="http://schemas.openxmlformats.org/presentationml/2006/main">
+  <p:cSld>
+    <p:spTree>
+      <p:nvGrpSpPr>
+        <p:cNvPr id="1" name=""/>
+        <p:cNvGrpSpPr/>
+        <p:nvPr/>
+      </p:nvGrpSpPr>
+      <p:grpSpPr>
+        <a:xfrm>
+          <a:off x="0" y="0"/>
+          <a:ext cx="0" cy="0"/>
+          <a:chOff x="0" y="0"/>
+          <a:chExt cx="0" cy="0"/>
+        </a:xfrm>
+      </p:grpSpPr>
+      <p:sp>
+        <p:nvSpPr>
+          <p:cNvPr id="2" name="Title 1">
+            <a:extLst>
+              <a:ext uri="{FF2B5EF4-FFF2-40B4-BE49-F238E27FC236}">
+                <a16:creationId xmlns:a16="http://schemas.microsoft.com/office/drawing/2014/main" id="{E49F2815-CF81-5844-9510-1B4278D82AC0}"/>
+              </a:ext>
+            </a:extLst>
+          </p:cNvPr>
+          <p:cNvSpPr>
+            <a:spLocks noGrp="1"/>
+          </p:cNvSpPr>
+          <p:nvPr>
+            <p:ph type="title"/>
+          </p:nvPr>
+        </p:nvSpPr>
+        <p:spPr/>
+        <p:txBody>
+          <a:bodyPr/>
+          <a:lstStyle/>
+          <a:p>
+            <a:r>
+              <a:rPr lang="en-US" dirty="0"/>
+              <a:t>Interfaces</a:t>
+            </a:r>
+          </a:p>
+        </p:txBody>
+      </p:sp>
+      <p:sp>
+        <p:nvSpPr>
+          <p:cNvPr id="3" name="Text Placeholder 2">
+            <a:extLst>
+              <a:ext uri="{FF2B5EF4-FFF2-40B4-BE49-F238E27FC236}">
+                <a16:creationId xmlns:a16="http://schemas.microsoft.com/office/drawing/2014/main" id="{8672CF9B-1F92-FB42-8AA1-8B15DD8677B2}"/>
+              </a:ext>
+            </a:extLst>
+          </p:cNvPr>
+          <p:cNvSpPr>
+            <a:spLocks noGrp="1"/>
+          </p:cNvSpPr>
+          <p:nvPr>
+            <p:ph type="body" idx="1"/>
+          </p:nvPr>
+        </p:nvSpPr>
+        <p:spPr/>
+        <p:txBody>
+          <a:bodyPr/>
+          <a:lstStyle/>
+          <a:p>
+            <a:r>
+              <a:rPr lang="en-US" dirty="0"/>
+              <a:t> There are two primary ways to use Interfaces in GO:</a:t>
+            </a:r>
+          </a:p>
+          <a:p>
+            <a:pPr lvl="1"/>
+            <a:r>
+              <a:rPr lang="en-US" dirty="0"/>
+              <a:t>As a set of methods to achieve polymorphism and</a:t>
+            </a:r>
+          </a:p>
+          <a:p>
+            <a:pPr lvl="1"/>
+            <a:r>
+              <a:rPr lang="en-US" dirty="0"/>
+              <a:t>As a type </a:t>
+            </a:r>
+            <a:r>
+              <a:rPr lang="en-US" i="1" dirty="0"/>
+              <a:t>that is dynamic</a:t>
+            </a:r>
+            <a:r>
+              <a:rPr lang="en-US" dirty="0"/>
+              <a:t>. </a:t>
+            </a:r>
+          </a:p>
+          <a:p>
+            <a:r>
+              <a:rPr lang="en-US" dirty="0"/>
+              <a:t>We’ve been over the first one of these so let’s talk about the second one here: </a:t>
+            </a:r>
+            <a:r>
+              <a:rPr lang="en-US" i="1" dirty="0"/>
+              <a:t>the empty interface</a:t>
+            </a:r>
+            <a:endParaRPr lang="en-US" dirty="0"/>
+          </a:p>
+        </p:txBody>
+      </p:sp>
+      <p:pic>
+        <p:nvPicPr>
+          <p:cNvPr id="13314" name="Picture 2" descr="Image result for golang gopher">
+            <a:extLst>
+              <a:ext uri="{FF2B5EF4-FFF2-40B4-BE49-F238E27FC236}">
+                <a16:creationId xmlns:a16="http://schemas.microsoft.com/office/drawing/2014/main" id="{D8338E18-F367-7049-903F-F237BD6E0518}"/>
+              </a:ext>
+            </a:extLst>
+          </p:cNvPr>
+          <p:cNvPicPr>
+            <a:picLocks noChangeAspect="1" noChangeArrowheads="1"/>
+          </p:cNvPicPr>
+          <p:nvPr/>
+        </p:nvPicPr>
+        <p:blipFill>
+          <a:blip r:embed="rId2">
+            <a:extLst>
+              <a:ext uri="{28A0092B-C50C-407E-A947-70E740481C1C}">
+                <a14:useLocalDpi xmlns:a14="http://schemas.microsoft.com/office/drawing/2010/main" val="0"/>
+              </a:ext>
+            </a:extLst>
+          </a:blip>
+          <a:srcRect/>
+          <a:stretch>
+            <a:fillRect/>
+          </a:stretch>
+        </p:blipFill>
+        <p:spPr bwMode="auto">
+          <a:xfrm>
+            <a:off x="3035300" y="4031268"/>
+            <a:ext cx="3073400" cy="2641600"/>
+          </a:xfrm>
+          <a:prstGeom prst="rect">
+            <a:avLst/>
+          </a:prstGeom>
+          <a:noFill/>
+          <a:extLst>
+            <a:ext uri="{909E8E84-426E-40DD-AFC4-6F175D3DCCD1}">
+              <a14:hiddenFill xmlns:a14="http://schemas.microsoft.com/office/drawing/2010/main">
+                <a:solidFill>
+                  <a:srgbClr val="FFFFFF"/>
+                </a:solidFill>
+              </a14:hiddenFill>
+            </a:ext>
+          </a:extLst>
+        </p:spPr>
+      </p:pic>
+    </p:spTree>
+    <p:extLst>
+      <p:ext uri="{BB962C8B-B14F-4D97-AF65-F5344CB8AC3E}">
+        <p14:creationId xmlns:p14="http://schemas.microsoft.com/office/powerpoint/2010/main" val="3098689698"/>
+      </p:ext>
+    </p:extLst>
+  </p:cSld>
+  <p:clrMapOvr>
+    <a:masterClrMapping/>
+  </p:clrMapOvr>
+</p:sld>
+</file>
+
+<file path=ppt/slides/slide54.xml><?xml version="1.0" encoding="utf-8"?>
+<p:sld xmlns:a="http://schemas.openxmlformats.org/drawingml/2006/main" xmlns:r="http://schemas.openxmlformats.org/officeDocument/2006/relationships" xmlns:p="http://schemas.openxmlformats.org/presentationml/2006/main">
+  <p:cSld>
+    <p:spTree>
+      <p:nvGrpSpPr>
+        <p:cNvPr id="1" name=""/>
+        <p:cNvGrpSpPr/>
+        <p:nvPr/>
+      </p:nvGrpSpPr>
+      <p:grpSpPr>
+        <a:xfrm>
+          <a:off x="0" y="0"/>
+          <a:ext cx="0" cy="0"/>
+          <a:chOff x="0" y="0"/>
+          <a:chExt cx="0" cy="0"/>
+        </a:xfrm>
+      </p:grpSpPr>
+      <p:sp>
+        <p:nvSpPr>
+          <p:cNvPr id="2" name="Title 1">
+            <a:extLst>
+              <a:ext uri="{FF2B5EF4-FFF2-40B4-BE49-F238E27FC236}">
+                <a16:creationId xmlns:a16="http://schemas.microsoft.com/office/drawing/2014/main" id="{EC30F22A-913A-E941-A316-326479C88EDC}"/>
+              </a:ext>
+            </a:extLst>
+          </p:cNvPr>
+          <p:cNvSpPr>
+            <a:spLocks noGrp="1"/>
+          </p:cNvSpPr>
+          <p:nvPr>
+            <p:ph type="title"/>
+          </p:nvPr>
+        </p:nvSpPr>
+        <p:spPr/>
+        <p:txBody>
+          <a:bodyPr/>
+          <a:lstStyle/>
+          <a:p>
+            <a:r>
+              <a:rPr lang="en-US" dirty="0"/>
+              <a:t>Interfaces and Generic</a:t>
+            </a:r>
+          </a:p>
+        </p:txBody>
+      </p:sp>
+      <p:sp>
+        <p:nvSpPr>
+          <p:cNvPr id="3" name="Text Placeholder 2">
+            <a:extLst>
+              <a:ext uri="{FF2B5EF4-FFF2-40B4-BE49-F238E27FC236}">
+                <a16:creationId xmlns:a16="http://schemas.microsoft.com/office/drawing/2014/main" id="{EECE5E67-48F2-2641-BDA1-311B5C71C1A8}"/>
+              </a:ext>
+            </a:extLst>
+          </p:cNvPr>
+          <p:cNvSpPr>
+            <a:spLocks noGrp="1"/>
+          </p:cNvSpPr>
+          <p:nvPr>
+            <p:ph type="body" idx="1"/>
+          </p:nvPr>
+        </p:nvSpPr>
+        <p:spPr/>
+        <p:txBody>
+          <a:bodyPr/>
+          <a:lstStyle/>
+          <a:p>
+            <a:r>
+              <a:rPr lang="en-US" dirty="0"/>
+              <a:t> From lesson one we must remember that </a:t>
+            </a:r>
+            <a:r>
+              <a:rPr lang="en-US" b="1" i="1" dirty="0" err="1"/>
+              <a:t>ther</a:t>
+            </a:r>
+            <a:r>
+              <a:rPr lang="en-US" b="1" i="1" dirty="0"/>
+              <a:t> are no generics in GO!</a:t>
+            </a:r>
+          </a:p>
+          <a:p>
+            <a:r>
+              <a:rPr lang="en-US" dirty="0"/>
+              <a:t>BUT….</a:t>
+            </a:r>
+          </a:p>
+          <a:p>
+            <a:r>
+              <a:rPr lang="en-US" dirty="0"/>
+              <a:t>EMPTY INTERFACES (interfaces that are not pre-defined and have NO methods)--&gt; </a:t>
+            </a:r>
+            <a:r>
+              <a:rPr lang="en-US" i="1" dirty="0"/>
+              <a:t>all types satisfy an empty interface!</a:t>
+            </a:r>
+            <a:endParaRPr lang="en-US" dirty="0"/>
+          </a:p>
+        </p:txBody>
+      </p:sp>
+      <p:pic>
+        <p:nvPicPr>
+          <p:cNvPr id="14338" name="Picture 2" descr="Image result for golang gopher">
+            <a:extLst>
+              <a:ext uri="{FF2B5EF4-FFF2-40B4-BE49-F238E27FC236}">
+                <a16:creationId xmlns:a16="http://schemas.microsoft.com/office/drawing/2014/main" id="{57CA7700-B6F9-CE45-88F5-829AE163E282}"/>
+              </a:ext>
+            </a:extLst>
+          </p:cNvPr>
+          <p:cNvPicPr>
+            <a:picLocks noChangeAspect="1" noChangeArrowheads="1"/>
+          </p:cNvPicPr>
+          <p:nvPr/>
+        </p:nvPicPr>
+        <p:blipFill>
+          <a:blip r:embed="rId2">
+            <a:extLst>
+              <a:ext uri="{28A0092B-C50C-407E-A947-70E740481C1C}">
+                <a14:useLocalDpi xmlns:a14="http://schemas.microsoft.com/office/drawing/2010/main" val="0"/>
+              </a:ext>
+            </a:extLst>
+          </a:blip>
+          <a:srcRect/>
+          <a:stretch>
+            <a:fillRect/>
+          </a:stretch>
+        </p:blipFill>
+        <p:spPr bwMode="auto">
+          <a:xfrm>
+            <a:off x="2039921" y="4454034"/>
+            <a:ext cx="4762500" cy="1701800"/>
+          </a:xfrm>
+          <a:prstGeom prst="rect">
+            <a:avLst/>
+          </a:prstGeom>
+          <a:noFill/>
+          <a:extLst>
+            <a:ext uri="{909E8E84-426E-40DD-AFC4-6F175D3DCCD1}">
+              <a14:hiddenFill xmlns:a14="http://schemas.microsoft.com/office/drawing/2010/main">
+                <a:solidFill>
+                  <a:srgbClr val="FFFFFF"/>
+                </a:solidFill>
+              </a14:hiddenFill>
+            </a:ext>
+          </a:extLst>
+        </p:spPr>
+      </p:pic>
+    </p:spTree>
+    <p:extLst>
+      <p:ext uri="{BB962C8B-B14F-4D97-AF65-F5344CB8AC3E}">
+        <p14:creationId xmlns:p14="http://schemas.microsoft.com/office/powerpoint/2010/main" val="597326973"/>
+      </p:ext>
+    </p:extLst>
+  </p:cSld>
+  <p:clrMapOvr>
+    <a:masterClrMapping/>
+  </p:clrMapOvr>
+</p:sld>
+</file>
+
+<file path=ppt/slides/slide55.xml><?xml version="1.0" encoding="utf-8"?>
+<p:sld xmlns:a="http://schemas.openxmlformats.org/drawingml/2006/main" xmlns:r="http://schemas.openxmlformats.org/officeDocument/2006/relationships" xmlns:p="http://schemas.openxmlformats.org/presentationml/2006/main">
+  <p:cSld>
+    <p:spTree>
+      <p:nvGrpSpPr>
+        <p:cNvPr id="1" name=""/>
+        <p:cNvGrpSpPr/>
+        <p:nvPr/>
+      </p:nvGrpSpPr>
+      <p:grpSpPr>
+        <a:xfrm>
+          <a:off x="0" y="0"/>
+          <a:ext cx="0" cy="0"/>
+          <a:chOff x="0" y="0"/>
+          <a:chExt cx="0" cy="0"/>
+        </a:xfrm>
+      </p:grpSpPr>
+      <p:sp>
+        <p:nvSpPr>
+          <p:cNvPr id="2" name="Title 1">
+            <a:extLst>
+              <a:ext uri="{FF2B5EF4-FFF2-40B4-BE49-F238E27FC236}">
+                <a16:creationId xmlns:a16="http://schemas.microsoft.com/office/drawing/2014/main" id="{F4FC02CC-566B-7542-A64E-ED73A4F5A204}"/>
+              </a:ext>
+            </a:extLst>
+          </p:cNvPr>
+          <p:cNvSpPr>
+            <a:spLocks noGrp="1"/>
+          </p:cNvSpPr>
+          <p:nvPr>
+            <p:ph type="title"/>
+          </p:nvPr>
+        </p:nvSpPr>
+        <p:spPr/>
+        <p:txBody>
+          <a:bodyPr/>
+          <a:lstStyle/>
+          <a:p>
+            <a:r>
+              <a:rPr lang="en-US" dirty="0"/>
+              <a:t>Empty interfaces (continued)</a:t>
+            </a:r>
+          </a:p>
+        </p:txBody>
+      </p:sp>
+      <p:sp>
+        <p:nvSpPr>
+          <p:cNvPr id="3" name="Text Placeholder 2">
+            <a:extLst>
+              <a:ext uri="{FF2B5EF4-FFF2-40B4-BE49-F238E27FC236}">
+                <a16:creationId xmlns:a16="http://schemas.microsoft.com/office/drawing/2014/main" id="{F20E3FFB-C90E-3247-9403-7A655F412F05}"/>
+              </a:ext>
+            </a:extLst>
+          </p:cNvPr>
+          <p:cNvSpPr>
+            <a:spLocks noGrp="1"/>
+          </p:cNvSpPr>
+          <p:nvPr>
+            <p:ph type="body" idx="1"/>
+          </p:nvPr>
+        </p:nvSpPr>
+        <p:spPr/>
+        <p:txBody>
+          <a:bodyPr/>
+          <a:lstStyle/>
+          <a:p>
+            <a:r>
+              <a:rPr lang="en-US" dirty="0"/>
+              <a:t> So what does this mean? Basically it means that when you have an interface as an input to a function it will accept any parameter but (and this is important): </a:t>
+            </a:r>
+            <a:r>
+              <a:rPr lang="en-US" b="1" i="1" dirty="0"/>
+              <a:t>That parameter will then be of interface TYPE</a:t>
+            </a:r>
+            <a:r>
+              <a:rPr lang="en-US" dirty="0"/>
+              <a:t>…</a:t>
+            </a:r>
+          </a:p>
+          <a:p>
+            <a:r>
+              <a:rPr lang="en-US" dirty="0"/>
+              <a:t>So you haven’t </a:t>
+            </a:r>
+            <a:r>
+              <a:rPr lang="en-US" b="1" dirty="0"/>
+              <a:t>really</a:t>
+            </a:r>
+            <a:r>
+              <a:rPr lang="en-US" dirty="0"/>
+              <a:t> created generics here- all you’ve done is delayed them (as we can see in the labs).</a:t>
+            </a:r>
+          </a:p>
+        </p:txBody>
+      </p:sp>
+      <p:pic>
+        <p:nvPicPr>
+          <p:cNvPr id="15362" name="Picture 2" descr="Image result for golang gopher">
+            <a:extLst>
+              <a:ext uri="{FF2B5EF4-FFF2-40B4-BE49-F238E27FC236}">
+                <a16:creationId xmlns:a16="http://schemas.microsoft.com/office/drawing/2014/main" id="{3F9548C3-FE99-C64C-A262-0A859B2D56FC}"/>
+              </a:ext>
+            </a:extLst>
+          </p:cNvPr>
+          <p:cNvPicPr>
+            <a:picLocks noChangeAspect="1" noChangeArrowheads="1"/>
+          </p:cNvPicPr>
+          <p:nvPr/>
+        </p:nvPicPr>
+        <p:blipFill>
+          <a:blip r:embed="rId2">
+            <a:extLst>
+              <a:ext uri="{28A0092B-C50C-407E-A947-70E740481C1C}">
+                <a14:useLocalDpi xmlns:a14="http://schemas.microsoft.com/office/drawing/2010/main" val="0"/>
+              </a:ext>
+            </a:extLst>
+          </a:blip>
+          <a:srcRect/>
+          <a:stretch>
+            <a:fillRect/>
+          </a:stretch>
+        </p:blipFill>
+        <p:spPr bwMode="auto">
+          <a:xfrm>
+            <a:off x="4150194" y="4628560"/>
+            <a:ext cx="1373781" cy="1916063"/>
+          </a:xfrm>
+          <a:prstGeom prst="rect">
+            <a:avLst/>
+          </a:prstGeom>
+          <a:noFill/>
+          <a:extLst>
+            <a:ext uri="{909E8E84-426E-40DD-AFC4-6F175D3DCCD1}">
+              <a14:hiddenFill xmlns:a14="http://schemas.microsoft.com/office/drawing/2010/main">
+                <a:solidFill>
+                  <a:srgbClr val="FFFFFF"/>
+                </a:solidFill>
+              </a14:hiddenFill>
+            </a:ext>
+          </a:extLst>
+        </p:spPr>
+      </p:pic>
+    </p:spTree>
+    <p:extLst>
+      <p:ext uri="{BB962C8B-B14F-4D97-AF65-F5344CB8AC3E}">
+        <p14:creationId xmlns:p14="http://schemas.microsoft.com/office/powerpoint/2010/main" val="2288747888"/>
+      </p:ext>
+    </p:extLst>
+  </p:cSld>
+  <p:clrMapOvr>
+    <a:masterClrMapping/>
+  </p:clrMapOvr>
+</p:sld>
+</file>
+
+<file path=ppt/slides/slide56.xml><?xml version="1.0" encoding="utf-8"?>
+<p:sld xmlns:a="http://schemas.openxmlformats.org/drawingml/2006/main" xmlns:r="http://schemas.openxmlformats.org/officeDocument/2006/relationships" xmlns:p="http://schemas.openxmlformats.org/presentationml/2006/main">
+  <p:cSld>
+    <p:spTree>
+      <p:nvGrpSpPr>
+        <p:cNvPr id="1" name=""/>
+        <p:cNvGrpSpPr/>
+        <p:nvPr/>
+      </p:nvGrpSpPr>
+      <p:grpSpPr>
+        <a:xfrm>
+          <a:off x="0" y="0"/>
+          <a:ext cx="0" cy="0"/>
+          <a:chOff x="0" y="0"/>
+          <a:chExt cx="0" cy="0"/>
+        </a:xfrm>
+      </p:grpSpPr>
+      <p:sp>
+        <p:nvSpPr>
+          <p:cNvPr id="2" name="Title 1">
+            <a:extLst>
+              <a:ext uri="{FF2B5EF4-FFF2-40B4-BE49-F238E27FC236}">
+                <a16:creationId xmlns:a16="http://schemas.microsoft.com/office/drawing/2014/main" id="{8E6820F1-D1A3-CB47-8791-1850291DD655}"/>
+              </a:ext>
+            </a:extLst>
+          </p:cNvPr>
+          <p:cNvSpPr>
+            <a:spLocks noGrp="1"/>
+          </p:cNvSpPr>
+          <p:nvPr>
+            <p:ph type="title"/>
+          </p:nvPr>
+        </p:nvSpPr>
+        <p:spPr/>
+        <p:txBody>
+          <a:bodyPr/>
+          <a:lstStyle/>
+          <a:p>
+            <a:r>
+              <a:rPr lang="en-US" dirty="0"/>
+              <a:t>Interfaces (again)</a:t>
+            </a:r>
+          </a:p>
+        </p:txBody>
+      </p:sp>
+      <p:sp>
+        <p:nvSpPr>
+          <p:cNvPr id="3" name="Text Placeholder 2">
+            <a:extLst>
+              <a:ext uri="{FF2B5EF4-FFF2-40B4-BE49-F238E27FC236}">
+                <a16:creationId xmlns:a16="http://schemas.microsoft.com/office/drawing/2014/main" id="{75648518-5250-FA42-86B7-3B5806B58B86}"/>
+              </a:ext>
+            </a:extLst>
+          </p:cNvPr>
+          <p:cNvSpPr>
+            <a:spLocks noGrp="1"/>
+          </p:cNvSpPr>
+          <p:nvPr>
+            <p:ph type="body" idx="1"/>
+          </p:nvPr>
+        </p:nvSpPr>
+        <p:spPr/>
+        <p:txBody>
+          <a:bodyPr/>
+          <a:lstStyle/>
+          <a:p>
+            <a:r>
+              <a:rPr lang="en-US" dirty="0"/>
+              <a:t> Fun fact- the vast majority of inputs for </a:t>
+            </a:r>
+            <a:r>
+              <a:rPr lang="en-US" b="1" dirty="0"/>
+              <a:t>built-in</a:t>
+            </a:r>
+            <a:r>
+              <a:rPr lang="en-US" dirty="0"/>
+              <a:t> functions in GO are of type interface. </a:t>
+            </a:r>
+          </a:p>
+          <a:p>
+            <a:r>
+              <a:rPr lang="en-US" dirty="0"/>
+              <a:t> If you really aren’t sure of the type of input coming in (if you are parsing JSON from an API or something) then use a combination of “interface{}” and “switch” statements to </a:t>
+            </a:r>
+            <a:r>
+              <a:rPr lang="en-US" dirty="0" err="1"/>
+              <a:t>unmarshal</a:t>
+            </a:r>
+            <a:r>
+              <a:rPr lang="en-US" dirty="0"/>
+              <a:t> into a struct.</a:t>
+            </a:r>
+          </a:p>
+        </p:txBody>
+      </p:sp>
+      <p:pic>
+        <p:nvPicPr>
+          <p:cNvPr id="16386" name="Picture 2" descr="Image result for golang gopher">
+            <a:extLst>
+              <a:ext uri="{FF2B5EF4-FFF2-40B4-BE49-F238E27FC236}">
+                <a16:creationId xmlns:a16="http://schemas.microsoft.com/office/drawing/2014/main" id="{45310AAA-33FB-3847-A2F2-87EA4507D14F}"/>
+              </a:ext>
+            </a:extLst>
+          </p:cNvPr>
+          <p:cNvPicPr>
+            <a:picLocks noChangeAspect="1" noChangeArrowheads="1"/>
+          </p:cNvPicPr>
+          <p:nvPr/>
+        </p:nvPicPr>
+        <p:blipFill>
+          <a:blip r:embed="rId2">
+            <a:extLst>
+              <a:ext uri="{28A0092B-C50C-407E-A947-70E740481C1C}">
+                <a14:useLocalDpi xmlns:a14="http://schemas.microsoft.com/office/drawing/2010/main" val="0"/>
+              </a:ext>
+            </a:extLst>
+          </a:blip>
+          <a:srcRect/>
+          <a:stretch>
+            <a:fillRect/>
+          </a:stretch>
+        </p:blipFill>
+        <p:spPr bwMode="auto">
+          <a:xfrm>
+            <a:off x="2499805" y="4330699"/>
+            <a:ext cx="3937000" cy="2070100"/>
+          </a:xfrm>
+          <a:prstGeom prst="rect">
+            <a:avLst/>
+          </a:prstGeom>
+          <a:noFill/>
+          <a:extLst>
+            <a:ext uri="{909E8E84-426E-40DD-AFC4-6F175D3DCCD1}">
+              <a14:hiddenFill xmlns:a14="http://schemas.microsoft.com/office/drawing/2010/main">
+                <a:solidFill>
+                  <a:srgbClr val="FFFFFF"/>
+                </a:solidFill>
+              </a14:hiddenFill>
+            </a:ext>
+          </a:extLst>
+        </p:spPr>
+      </p:pic>
+    </p:spTree>
+    <p:extLst>
+      <p:ext uri="{BB962C8B-B14F-4D97-AF65-F5344CB8AC3E}">
+        <p14:creationId xmlns:p14="http://schemas.microsoft.com/office/powerpoint/2010/main" val="1830205327"/>
+      </p:ext>
+    </p:extLst>
+  </p:cSld>
+  <p:clrMapOvr>
+    <a:masterClrMapping/>
+  </p:clrMapOvr>
+</p:sld>
+</file>
+
+<file path=ppt/slides/slide57.xml><?xml version="1.0" encoding="utf-8"?>
+<p:sld xmlns:a="http://schemas.openxmlformats.org/drawingml/2006/main" xmlns:r="http://schemas.openxmlformats.org/officeDocument/2006/relationships" xmlns:p="http://schemas.openxmlformats.org/presentationml/2006/main">
+  <p:cSld>
+    <p:spTree>
+      <p:nvGrpSpPr>
+        <p:cNvPr id="1" name="Shape 113"/>
+        <p:cNvGrpSpPr/>
+        <p:nvPr/>
+      </p:nvGrpSpPr>
+      <p:grpSpPr>
+        <a:xfrm>
+          <a:off x="0" y="0"/>
+          <a:ext cx="0" cy="0"/>
+          <a:chOff x="0" y="0"/>
+          <a:chExt cx="0" cy="0"/>
+        </a:xfrm>
+      </p:grpSpPr>
+      <p:sp>
+        <p:nvSpPr>
+          <p:cNvPr id="114" name="Shape 114"/>
+          <p:cNvSpPr txBox="1">
+            <a:spLocks noGrp="1"/>
+          </p:cNvSpPr>
+          <p:nvPr>
+            <p:ph type="title"/>
+          </p:nvPr>
+        </p:nvSpPr>
+        <p:spPr>
+          <a:xfrm>
+            <a:off x="76200" y="152400"/>
+            <a:ext cx="8991600" cy="671400"/>
+          </a:xfrm>
+          <a:prstGeom prst="rect">
+            <a:avLst/>
+          </a:prstGeom>
+        </p:spPr>
+        <p:txBody>
+          <a:bodyPr lIns="91425" tIns="91425" rIns="91425" bIns="91425" anchor="ctr" anchorCtr="0">
+            <a:noAutofit/>
+          </a:bodyPr>
+          <a:lstStyle/>
+          <a:p>
+            <a:pPr lvl="0">
+              <a:spcBef>
+                <a:spcPts val="0"/>
+              </a:spcBef>
+              <a:buNone/>
+            </a:pPr>
+            <a:r>
+              <a:rPr lang="en-US" dirty="0"/>
+              <a:t>DATA TYPES!!</a:t>
+            </a:r>
+            <a:endParaRPr dirty="0"/>
+          </a:p>
+        </p:txBody>
+      </p:sp>
+      <p:sp>
+        <p:nvSpPr>
+          <p:cNvPr id="115" name="Shape 115"/>
+          <p:cNvSpPr txBox="1">
+            <a:spLocks noGrp="1"/>
+          </p:cNvSpPr>
+          <p:nvPr>
+            <p:ph type="body" idx="1"/>
+          </p:nvPr>
+        </p:nvSpPr>
+        <p:spPr>
+          <a:xfrm>
+            <a:off x="76200" y="1240810"/>
+            <a:ext cx="8991600" cy="4070929"/>
+          </a:xfrm>
+          <a:prstGeom prst="rect">
+            <a:avLst/>
+          </a:prstGeom>
+        </p:spPr>
+        <p:txBody>
+          <a:bodyPr lIns="91425" tIns="91425" rIns="91425" bIns="91425" anchor="t" anchorCtr="0">
+            <a:noAutofit/>
+          </a:bodyPr>
+          <a:lstStyle/>
+          <a:p>
+            <a:pPr lvl="2">
+              <a:spcBef>
+                <a:spcPts val="0"/>
+              </a:spcBef>
+            </a:pPr>
+            <a:r>
+              <a:rPr lang="en-US" dirty="0">
+                <a:solidFill>
+                  <a:schemeClr val="tx1"/>
+                </a:solidFill>
+                <a:latin typeface="+mn-lt"/>
+              </a:rPr>
+              <a:t>AND WE’RE DONE!</a:t>
+            </a:r>
+          </a:p>
+          <a:p>
+            <a:pPr lvl="2">
+              <a:spcBef>
+                <a:spcPts val="0"/>
+              </a:spcBef>
+            </a:pPr>
+            <a:r>
+              <a:rPr lang="en-US" sz="3200" dirty="0">
+                <a:solidFill>
+                  <a:schemeClr val="tx1"/>
+                </a:solidFill>
+                <a:latin typeface="+mn-lt"/>
+              </a:rPr>
+              <a:t>ANY QUESTIONS?!?</a:t>
+            </a:r>
+          </a:p>
+          <a:p>
+            <a:pPr lvl="3">
+              <a:spcBef>
+                <a:spcPts val="0"/>
+              </a:spcBef>
+            </a:pPr>
+            <a:endParaRPr lang="en-US" dirty="0">
+              <a:solidFill>
+                <a:schemeClr val="tx1"/>
+              </a:solidFill>
+              <a:latin typeface="+mn-lt"/>
+            </a:endParaRPr>
+          </a:p>
+          <a:p>
+            <a:pPr lvl="2">
+              <a:spcBef>
+                <a:spcPts val="0"/>
+              </a:spcBef>
+            </a:pPr>
+            <a:endParaRPr lang="en-US" dirty="0">
+              <a:solidFill>
+                <a:schemeClr val="tx1"/>
+              </a:solidFill>
+            </a:endParaRPr>
+          </a:p>
+          <a:p>
+            <a:pPr marL="1485900" lvl="3" indent="0">
+              <a:spcBef>
+                <a:spcPts val="0"/>
+              </a:spcBef>
+              <a:buNone/>
+            </a:pPr>
+            <a:endParaRPr lang="en-US" dirty="0">
+              <a:solidFill>
+                <a:schemeClr val="tx1"/>
+              </a:solidFill>
+              <a:latin typeface="+mn-lt"/>
+            </a:endParaRPr>
+          </a:p>
+          <a:p>
+            <a:pPr marL="1485900" lvl="3" indent="0">
+              <a:spcBef>
+                <a:spcPts val="0"/>
+              </a:spcBef>
+              <a:buNone/>
+            </a:pPr>
+            <a:endParaRPr lang="en-US" dirty="0">
+              <a:solidFill>
+                <a:schemeClr val="tx1"/>
+              </a:solidFill>
+              <a:latin typeface="+mn-lt"/>
+            </a:endParaRPr>
+          </a:p>
+          <a:p>
+            <a:pPr marL="1485900" lvl="3" indent="0">
+              <a:spcBef>
+                <a:spcPts val="0"/>
+              </a:spcBef>
+              <a:buNone/>
+            </a:pPr>
+            <a:endParaRPr lang="en-US" dirty="0">
+              <a:solidFill>
+                <a:schemeClr val="tx1"/>
+              </a:solidFill>
+              <a:latin typeface="+mn-lt"/>
+            </a:endParaRPr>
+          </a:p>
+          <a:p>
+            <a:pPr marL="1485900" lvl="3" indent="0">
+              <a:spcBef>
+                <a:spcPts val="0"/>
+              </a:spcBef>
+              <a:buNone/>
+            </a:pPr>
+            <a:endParaRPr lang="en-US" dirty="0">
+              <a:solidFill>
+                <a:schemeClr val="tx1"/>
+              </a:solidFill>
+              <a:latin typeface="+mn-lt"/>
+            </a:endParaRPr>
+          </a:p>
+          <a:p>
+            <a:pPr marL="1485900" lvl="3" indent="0">
+              <a:spcBef>
+                <a:spcPts val="0"/>
+              </a:spcBef>
+              <a:buNone/>
+            </a:pPr>
+            <a:endParaRPr lang="en-US" dirty="0">
+              <a:solidFill>
+                <a:schemeClr val="tx1"/>
+              </a:solidFill>
+              <a:latin typeface="+mn-lt"/>
+            </a:endParaRPr>
+          </a:p>
+        </p:txBody>
+      </p:sp>
+      <p:pic>
+        <p:nvPicPr>
+          <p:cNvPr id="14338" name="Picture 2" descr="Image result for golang gopher, images">
+            <a:extLst>
+              <a:ext uri="{FF2B5EF4-FFF2-40B4-BE49-F238E27FC236}">
+                <a16:creationId xmlns:a16="http://schemas.microsoft.com/office/drawing/2014/main" id="{99F98B07-359E-7D45-BFB0-9CFB89F92F9B}"/>
+              </a:ext>
+            </a:extLst>
+          </p:cNvPr>
+          <p:cNvPicPr>
+            <a:picLocks noChangeAspect="1" noChangeArrowheads="1"/>
+          </p:cNvPicPr>
+          <p:nvPr/>
+        </p:nvPicPr>
+        <p:blipFill>
+          <a:blip r:embed="rId3">
+            <a:extLst>
+              <a:ext uri="{28A0092B-C50C-407E-A947-70E740481C1C}">
+                <a14:useLocalDpi xmlns:a14="http://schemas.microsoft.com/office/drawing/2010/main" val="0"/>
+              </a:ext>
+            </a:extLst>
+          </a:blip>
+          <a:srcRect/>
+          <a:stretch>
+            <a:fillRect/>
+          </a:stretch>
+        </p:blipFill>
+        <p:spPr bwMode="auto">
+          <a:xfrm>
+            <a:off x="3075040" y="3147245"/>
+            <a:ext cx="2603500" cy="3111500"/>
+          </a:xfrm>
+          <a:prstGeom prst="rect">
+            <a:avLst/>
+          </a:prstGeom>
+          <a:noFill/>
+          <a:extLst>
+            <a:ext uri="{909E8E84-426E-40DD-AFC4-6F175D3DCCD1}">
+              <a14:hiddenFill xmlns:a14="http://schemas.microsoft.com/office/drawing/2010/main">
+                <a:solidFill>
+                  <a:srgbClr val="FFFFFF"/>
+                </a:solidFill>
+              </a14:hiddenFill>
+            </a:ext>
+          </a:extLst>
+        </p:spPr>
+      </p:pic>
+    </p:spTree>
+    <p:extLst>
+      <p:ext uri="{BB962C8B-B14F-4D97-AF65-F5344CB8AC3E}">
+        <p14:creationId xmlns:p14="http://schemas.microsoft.com/office/powerpoint/2010/main" val="3120604218"/>
       </p:ext>
     </p:extLst>
   </p:cSld>

</xml_diff>